<commit_message>
updates to the poster, and plotting updates. added 90th and 10th percentile histograms to impact_vir vs EW plots also
</commit_message>
<xml_diff>
--- a/berlin_poster/berlin_poster.pptx
+++ b/berlin_poster/berlin_poster.pptx
@@ -3907,35 +3907,6 @@
           </a:p>
         </p:txBody>
       </p:sp>
-      <p:pic>
-        <p:nvPicPr>
-          <p:cNvPr id="31" name="Picture 30" descr="map2_PG1302-102_1313_nolabels.pdf"/>
-          <p:cNvPicPr>
-            <a:picLocks noChangeAspect="1"/>
-          </p:cNvPicPr>
-          <p:nvPr/>
-        </p:nvPicPr>
-        <p:blipFill rotWithShape="1">
-          <a:blip r:embed="rId6">
-            <a:extLst>
-              <a:ext uri="{28A0092B-C50C-407E-A947-70E740481C1C}">
-                <a14:useLocalDpi xmlns:a14="http://schemas.microsoft.com/office/drawing/2010/main" val="0"/>
-              </a:ext>
-            </a:extLst>
-          </a:blip>
-          <a:srcRect l="5446" t="6004" r="12321" b="4449"/>
-          <a:stretch/>
-        </p:blipFill>
-        <p:spPr>
-          <a:xfrm>
-            <a:off x="1972418" y="7216993"/>
-            <a:ext cx="7391346" cy="5993745"/>
-          </a:xfrm>
-          <a:prstGeom prst="rect">
-            <a:avLst/>
-          </a:prstGeom>
-        </p:spPr>
-      </p:pic>
       <p:sp>
         <p:nvSpPr>
           <p:cNvPr id="34" name="Round Single Corner Rectangle 33"/>
@@ -4045,7 +4016,7 @@
         <p:spPr>
           <a:xfrm>
             <a:off x="11461493" y="8453812"/>
-            <a:ext cx="7484266" cy="8402300"/>
+            <a:ext cx="7484266" cy="7940635"/>
           </a:xfrm>
           <a:prstGeom prst="rect">
             <a:avLst/>
@@ -4146,7 +4117,16 @@
                 </a:solidFill>
                 <a:cs typeface="Helvetica Neue"/>
               </a:rPr>
-              <a:t> There are currently over 250 QSO sightlines available, and we present preliminary results from an initial sample of 35 target sightlines chosen for their proximity to large</a:t>
+              <a:t> </a:t>
+            </a:r>
+            <a:r>
+              <a:rPr lang="en-US" sz="3000" u="none" baseline="0" dirty="0" smtClean="0">
+                <a:solidFill>
+                  <a:prstClr val="black"/>
+                </a:solidFill>
+                <a:cs typeface="Helvetica Neue"/>
+              </a:rPr>
+              <a:t>We present</a:t>
             </a:r>
             <a:r>
               <a:rPr lang="en-US" sz="3000" u="none" dirty="0" smtClean="0">
@@ -4155,7 +4135,25 @@
                 </a:solidFill>
                 <a:cs typeface="Helvetica Neue"/>
               </a:rPr>
-              <a:t> </a:t>
+              <a:t> results from an initial sample of 43 COS sightlines, chosen for their proximity to large (D &gt; 25 </a:t>
+            </a:r>
+            <a:r>
+              <a:rPr lang="en-US" sz="3000" u="none" dirty="0" err="1" smtClean="0">
+                <a:solidFill>
+                  <a:prstClr val="black"/>
+                </a:solidFill>
+                <a:cs typeface="Helvetica Neue"/>
+              </a:rPr>
+              <a:t>kpc</a:t>
+            </a:r>
+            <a:r>
+              <a:rPr lang="en-US" sz="3000" u="none" dirty="0" smtClean="0">
+                <a:solidFill>
+                  <a:prstClr val="black"/>
+                </a:solidFill>
+                <a:cs typeface="Helvetica Neue"/>
+              </a:rPr>
+              <a:t>) galaxies and high signal-to-noise (S/N &gt;11)</a:t>
             </a:r>
             <a:r>
               <a:rPr lang="en-US" sz="3000" u="none" baseline="0" dirty="0" smtClean="0">
@@ -4164,7 +4162,7 @@
                 </a:solidFill>
                 <a:cs typeface="Helvetica Neue"/>
               </a:rPr>
-              <a:t>galaxies. </a:t>
+              <a:t>.</a:t>
             </a:r>
             <a:endParaRPr lang="en-US" sz="3000" dirty="0">
               <a:cs typeface="Helvetica Neue"/>
@@ -4214,35 +4212,6 @@
           </a:p>
         </p:txBody>
       </p:sp>
-      <p:pic>
-        <p:nvPicPr>
-          <p:cNvPr id="39" name="Picture 38" descr="figPG1302-102.pdf"/>
-          <p:cNvPicPr>
-            <a:picLocks noChangeAspect="1"/>
-          </p:cNvPicPr>
-          <p:nvPr/>
-        </p:nvPicPr>
-        <p:blipFill rotWithShape="1">
-          <a:blip r:embed="rId7">
-            <a:extLst>
-              <a:ext uri="{28A0092B-C50C-407E-A947-70E740481C1C}">
-                <a14:useLocalDpi xmlns:a14="http://schemas.microsoft.com/office/drawing/2010/main" val="0"/>
-              </a:ext>
-            </a:extLst>
-          </a:blip>
-          <a:srcRect l="6274" t="12925" r="21433" b="55687"/>
-          <a:stretch/>
-        </p:blipFill>
-        <p:spPr>
-          <a:xfrm>
-            <a:off x="2730142" y="13203406"/>
-            <a:ext cx="5502586" cy="2762833"/>
-          </a:xfrm>
-          <a:prstGeom prst="rect">
-            <a:avLst/>
-          </a:prstGeom>
-        </p:spPr>
-      </p:pic>
       <p:sp>
         <p:nvSpPr>
           <p:cNvPr id="40" name="TextBox 39"/>
@@ -4252,7 +4221,7 @@
         <p:spPr>
           <a:xfrm>
             <a:off x="1411130" y="15853714"/>
-            <a:ext cx="8431817" cy="1754327"/>
+            <a:ext cx="8431817" cy="1477328"/>
           </a:xfrm>
           <a:prstGeom prst="rect">
             <a:avLst/>
@@ -4281,7 +4250,71 @@
                   <a:srgbClr val="000000"/>
                 </a:solidFill>
               </a:rPr>
-              <a:t>Detected absorption at v = 1313 km/s in the PG1302-102 sightline with corresponding map of the absorber environment. </a:t>
+              <a:t>Detected absorption at v = </a:t>
+            </a:r>
+            <a:r>
+              <a:rPr lang="en-US" sz="1800" dirty="0" smtClean="0">
+                <a:solidFill>
+                  <a:srgbClr val="000000"/>
+                </a:solidFill>
+              </a:rPr>
+              <a:t>7039 km</a:t>
+            </a:r>
+            <a:r>
+              <a:rPr lang="en-US" sz="1800" dirty="0" smtClean="0">
+                <a:solidFill>
+                  <a:srgbClr val="000000"/>
+                </a:solidFill>
+              </a:rPr>
+              <a:t>/s in </a:t>
+            </a:r>
+            <a:r>
+              <a:rPr lang="en-US" sz="1800" dirty="0" smtClean="0">
+                <a:solidFill>
+                  <a:srgbClr val="000000"/>
+                </a:solidFill>
+              </a:rPr>
+              <a:t>the </a:t>
+            </a:r>
+            <a:r>
+              <a:rPr lang="is-IS" sz="1800" dirty="0" smtClean="0">
+                <a:solidFill>
+                  <a:srgbClr val="000000"/>
+                </a:solidFill>
+              </a:rPr>
+              <a:t>SDSSJ130524.30</a:t>
+            </a:r>
+            <a:r>
+              <a:rPr lang="is-IS" sz="1800" dirty="0">
+                <a:solidFill>
+                  <a:srgbClr val="000000"/>
+                </a:solidFill>
+              </a:rPr>
+              <a:t>+</a:t>
+            </a:r>
+            <a:r>
+              <a:rPr lang="is-IS" sz="1800" dirty="0" smtClean="0">
+                <a:solidFill>
+                  <a:srgbClr val="000000"/>
+                </a:solidFill>
+              </a:rPr>
+              <a:t>035731.0</a:t>
+            </a:r>
+            <a:r>
+              <a:rPr lang="en-US" sz="1800" dirty="0" smtClean="0">
+                <a:solidFill>
+                  <a:srgbClr val="000000"/>
+                </a:solidFill>
+              </a:rPr>
+              <a:t> </a:t>
+            </a:r>
+            <a:r>
+              <a:rPr lang="en-US" sz="1800" dirty="0" smtClean="0">
+                <a:solidFill>
+                  <a:srgbClr val="000000"/>
+                </a:solidFill>
+              </a:rPr>
+              <a:t>sightline with corresponding map of the absorber environment. </a:t>
             </a:r>
             <a:r>
               <a:rPr lang="en-US" sz="1800" b="1" dirty="0" smtClean="0">
@@ -4329,7 +4362,15 @@
                   <a:srgbClr val="000000"/>
                 </a:solidFill>
               </a:rPr>
-              <a:t>and size of galaxies is illustrated by ellipse major/minor axis, orientation, and relative size (actual size x6). Spiral type galaxies are solid ellipses, elliptical type are transparent, and unknowns are diamonds.</a:t>
+              <a:t>and size of galaxies is illustrated by ellipse major/minor axis, orientation, and relative size (actual size </a:t>
+            </a:r>
+            <a:r>
+              <a:rPr lang="en-US" sz="1800" dirty="0" smtClean="0">
+                <a:solidFill>
+                  <a:srgbClr val="000000"/>
+                </a:solidFill>
+              </a:rPr>
+              <a:t>x10).</a:t>
             </a:r>
             <a:endParaRPr lang="en-US" sz="1800" dirty="0">
               <a:solidFill>
@@ -4339,95 +4380,6 @@
           </a:p>
         </p:txBody>
       </p:sp>
-      <p:cxnSp>
-        <p:nvCxnSpPr>
-          <p:cNvPr id="41" name="Straight Connector 40"/>
-          <p:cNvCxnSpPr/>
-          <p:nvPr/>
-        </p:nvCxnSpPr>
-        <p:spPr>
-          <a:xfrm flipH="1">
-            <a:off x="3204828" y="10197155"/>
-            <a:ext cx="2090796" cy="3123691"/>
-          </a:xfrm>
-          <a:prstGeom prst="line">
-            <a:avLst/>
-          </a:prstGeom>
-        </p:spPr>
-        <p:style>
-          <a:lnRef idx="2">
-            <a:schemeClr val="dk1"/>
-          </a:lnRef>
-          <a:fillRef idx="0">
-            <a:schemeClr val="dk1"/>
-          </a:fillRef>
-          <a:effectRef idx="1">
-            <a:schemeClr val="dk1"/>
-          </a:effectRef>
-          <a:fontRef idx="minor">
-            <a:schemeClr val="tx1"/>
-          </a:fontRef>
-        </p:style>
-      </p:cxnSp>
-      <p:cxnSp>
-        <p:nvCxnSpPr>
-          <p:cNvPr id="43" name="Straight Connector 42"/>
-          <p:cNvCxnSpPr/>
-          <p:nvPr/>
-        </p:nvCxnSpPr>
-        <p:spPr>
-          <a:xfrm>
-            <a:off x="5481437" y="10197155"/>
-            <a:ext cx="2623777" cy="3123691"/>
-          </a:xfrm>
-          <a:prstGeom prst="line">
-            <a:avLst/>
-          </a:prstGeom>
-        </p:spPr>
-        <p:style>
-          <a:lnRef idx="2">
-            <a:schemeClr val="dk1"/>
-          </a:lnRef>
-          <a:fillRef idx="0">
-            <a:schemeClr val="dk1"/>
-          </a:fillRef>
-          <a:effectRef idx="1">
-            <a:schemeClr val="dk1"/>
-          </a:effectRef>
-          <a:fontRef idx="minor">
-            <a:schemeClr val="tx1"/>
-          </a:fontRef>
-        </p:style>
-      </p:cxnSp>
-      <p:pic>
-        <p:nvPicPr>
-          <p:cNvPr id="45" name="Picture 44" descr="map2_TON1009_4295_nolabels.pdf"/>
-          <p:cNvPicPr>
-            <a:picLocks noChangeAspect="1"/>
-          </p:cNvPicPr>
-          <p:nvPr/>
-        </p:nvPicPr>
-        <p:blipFill rotWithShape="1">
-          <a:blip r:embed="rId8">
-            <a:extLst>
-              <a:ext uri="{28A0092B-C50C-407E-A947-70E740481C1C}">
-                <a14:useLocalDpi xmlns:a14="http://schemas.microsoft.com/office/drawing/2010/main" val="0"/>
-              </a:ext>
-            </a:extLst>
-          </a:blip>
-          <a:srcRect l="5829" t="6539" r="12559" b="5181"/>
-          <a:stretch/>
-        </p:blipFill>
-        <p:spPr>
-          <a:xfrm>
-            <a:off x="21078841" y="7158524"/>
-            <a:ext cx="7042359" cy="5993745"/>
-          </a:xfrm>
-          <a:prstGeom prst="rect">
-            <a:avLst/>
-          </a:prstGeom>
-        </p:spPr>
-      </p:pic>
       <p:sp>
         <p:nvSpPr>
           <p:cNvPr id="46" name="Round Single Corner Rectangle 45"/>
@@ -4469,95 +4421,6 @@
           </a:p>
         </p:txBody>
       </p:sp>
-      <p:pic>
-        <p:nvPicPr>
-          <p:cNvPr id="23" name="Picture 22" descr="figTON1009.ps"/>
-          <p:cNvPicPr>
-            <a:picLocks noChangeAspect="1"/>
-          </p:cNvPicPr>
-          <p:nvPr/>
-        </p:nvPicPr>
-        <p:blipFill rotWithShape="1">
-          <a:blip r:embed="rId9">
-            <a:extLst>
-              <a:ext uri="{28A0092B-C50C-407E-A947-70E740481C1C}">
-                <a14:useLocalDpi xmlns:a14="http://schemas.microsoft.com/office/drawing/2010/main" val="0"/>
-              </a:ext>
-            </a:extLst>
-          </a:blip>
-          <a:srcRect l="6300" t="13310" r="21789" b="56541"/>
-          <a:stretch/>
-        </p:blipFill>
-        <p:spPr>
-          <a:xfrm>
-            <a:off x="21727831" y="13242219"/>
-            <a:ext cx="5402903" cy="2703862"/>
-          </a:xfrm>
-          <a:prstGeom prst="rect">
-            <a:avLst/>
-          </a:prstGeom>
-        </p:spPr>
-      </p:pic>
-      <p:cxnSp>
-        <p:nvCxnSpPr>
-          <p:cNvPr id="24" name="Straight Connector 23"/>
-          <p:cNvCxnSpPr/>
-          <p:nvPr/>
-        </p:nvCxnSpPr>
-        <p:spPr>
-          <a:xfrm flipH="1">
-            <a:off x="22201036" y="10141102"/>
-            <a:ext cx="2040058" cy="3204309"/>
-          </a:xfrm>
-          <a:prstGeom prst="line">
-            <a:avLst/>
-          </a:prstGeom>
-        </p:spPr>
-        <p:style>
-          <a:lnRef idx="2">
-            <a:schemeClr val="dk1"/>
-          </a:lnRef>
-          <a:fillRef idx="0">
-            <a:schemeClr val="dk1"/>
-          </a:fillRef>
-          <a:effectRef idx="1">
-            <a:schemeClr val="dk1"/>
-          </a:effectRef>
-          <a:fontRef idx="minor">
-            <a:schemeClr val="tx1"/>
-          </a:fontRef>
-        </p:style>
-      </p:cxnSp>
-      <p:cxnSp>
-        <p:nvCxnSpPr>
-          <p:cNvPr id="25" name="Straight Connector 24"/>
-          <p:cNvCxnSpPr/>
-          <p:nvPr/>
-        </p:nvCxnSpPr>
-        <p:spPr>
-          <a:xfrm>
-            <a:off x="24417084" y="10138687"/>
-            <a:ext cx="2619260" cy="3206724"/>
-          </a:xfrm>
-          <a:prstGeom prst="line">
-            <a:avLst/>
-          </a:prstGeom>
-        </p:spPr>
-        <p:style>
-          <a:lnRef idx="2">
-            <a:schemeClr val="dk1"/>
-          </a:lnRef>
-          <a:fillRef idx="0">
-            <a:schemeClr val="dk1"/>
-          </a:fillRef>
-          <a:effectRef idx="1">
-            <a:schemeClr val="dk1"/>
-          </a:effectRef>
-          <a:fontRef idx="minor">
-            <a:schemeClr val="tx1"/>
-          </a:fontRef>
-        </p:style>
-      </p:cxnSp>
       <p:sp>
         <p:nvSpPr>
           <p:cNvPr id="28" name="TextBox 27"/>
@@ -4567,7 +4430,7 @@
         <p:spPr>
           <a:xfrm>
             <a:off x="20361927" y="15855891"/>
-            <a:ext cx="8444996" cy="1754327"/>
+            <a:ext cx="8444996" cy="1477328"/>
           </a:xfrm>
           <a:prstGeom prst="rect">
             <a:avLst/>
@@ -4596,7 +4459,39 @@
                   <a:srgbClr val="000000"/>
                 </a:solidFill>
               </a:rPr>
-              <a:t>Detected absorption at v = 4295 km/s in the TON1009 sightline with corresponding map of the absorber environment. </a:t>
+              <a:t>Detected absorption at v </a:t>
+            </a:r>
+            <a:r>
+              <a:rPr lang="en-US" sz="1800" dirty="0" smtClean="0">
+                <a:solidFill>
+                  <a:srgbClr val="000000"/>
+                </a:solidFill>
+              </a:rPr>
+              <a:t>=3090 and 3192 km</a:t>
+            </a:r>
+            <a:r>
+              <a:rPr lang="en-US" sz="1800" dirty="0" smtClean="0">
+                <a:solidFill>
+                  <a:srgbClr val="000000"/>
+                </a:solidFill>
+              </a:rPr>
+              <a:t>/s in the </a:t>
+            </a:r>
+            <a:r>
+              <a:rPr lang="en-US" sz="1800" dirty="0" smtClean="0">
+                <a:solidFill>
+                  <a:srgbClr val="000000"/>
+                </a:solidFill>
+              </a:rPr>
+              <a:t>MRK290 sightline </a:t>
+            </a:r>
+            <a:r>
+              <a:rPr lang="en-US" sz="1800" dirty="0" smtClean="0">
+                <a:solidFill>
+                  <a:srgbClr val="000000"/>
+                </a:solidFill>
+              </a:rPr>
+              <a:t>with corresponding map of the absorber environment. </a:t>
             </a:r>
             <a:r>
               <a:rPr lang="en-US" sz="1800" b="1" dirty="0" smtClean="0">
@@ -4644,15 +4539,7 @@
                   <a:srgbClr val="000000"/>
                 </a:solidFill>
               </a:rPr>
-              <a:t>relative size (actual size x6</a:t>
-            </a:r>
-            <a:r>
-              <a:rPr lang="en-US" sz="1800" dirty="0">
-                <a:solidFill>
-                  <a:srgbClr val="000000"/>
-                </a:solidFill>
-              </a:rPr>
-              <a:t>). Spiral type galaxies are solid ellipses, elliptical type are transparent, and unknowns are diamonds</a:t>
+              <a:t>relative size (actual size </a:t>
             </a:r>
             <a:r>
               <a:rPr lang="en-US" sz="1800" dirty="0" smtClean="0">
@@ -4660,7 +4547,7 @@
                   <a:srgbClr val="000000"/>
                 </a:solidFill>
               </a:rPr>
-              <a:t>.</a:t>
+              <a:t>x10).</a:t>
             </a:r>
             <a:endParaRPr lang="en-US" sz="1800" dirty="0">
               <a:solidFill>
@@ -4679,7 +4566,7 @@
         <p:spPr>
           <a:xfrm>
             <a:off x="12982268" y="21814910"/>
-            <a:ext cx="4746345" cy="7448192"/>
+            <a:ext cx="4746345" cy="6432529"/>
           </a:xfrm>
           <a:prstGeom prst="rect">
             <a:avLst/>
@@ -4706,7 +4593,39 @@
                   <a:srgbClr val="000000"/>
                 </a:solidFill>
               </a:rPr>
-              <a:t>Equivalent width plotted against impact parameter, not normalized by galaxy size. No significant correlation is seen, suggesting that the larger galaxies harbor larger concentrations of </a:t>
+              <a:t>Equivalent </a:t>
+            </a:r>
+            <a:r>
+              <a:rPr lang="en-US" sz="2200" dirty="0" smtClean="0">
+                <a:solidFill>
+                  <a:srgbClr val="000000"/>
+                </a:solidFill>
+              </a:rPr>
+              <a:t>width (EW) </a:t>
+            </a:r>
+            <a:r>
+              <a:rPr lang="en-US" sz="2200" dirty="0">
+                <a:solidFill>
+                  <a:srgbClr val="000000"/>
+                </a:solidFill>
+              </a:rPr>
+              <a:t>plotted against impact </a:t>
+            </a:r>
+            <a:r>
+              <a:rPr lang="en-US" sz="2200" dirty="0" smtClean="0">
+                <a:solidFill>
+                  <a:srgbClr val="000000"/>
+                </a:solidFill>
+              </a:rPr>
+              <a:t>parameter. </a:t>
+            </a:r>
+            <a:r>
+              <a:rPr lang="en-US" sz="2200" dirty="0">
+                <a:solidFill>
+                  <a:srgbClr val="000000"/>
+                </a:solidFill>
+              </a:rPr>
+              <a:t>No significant correlation is seen, suggesting that the larger galaxies harbor larger concentrations of </a:t>
             </a:r>
             <a:r>
               <a:rPr lang="en-US" sz="2200" dirty="0" err="1">
@@ -4752,7 +4671,167 @@
                   <a:srgbClr val="000000"/>
                 </a:solidFill>
               </a:rPr>
-              <a:t> The equivalent width of absorbers is plotted against the impact parameter to each associated galaxy, normalized by the galaxy size. Color indicates the velocity of each absorber relative to the galaxy. Marginal histograms show the distributions of impact parameters and equivalent widths (for all absorbers). Weakly absorbing systems occur at all impact parameters, however the average equivalent width clearly increases with decreasing impact parameter</a:t>
+              <a:t> The </a:t>
+            </a:r>
+            <a:r>
+              <a:rPr lang="en-US" sz="2200" dirty="0" smtClean="0">
+                <a:solidFill>
+                  <a:srgbClr val="000000"/>
+                </a:solidFill>
+              </a:rPr>
+              <a:t>EW </a:t>
+            </a:r>
+            <a:r>
+              <a:rPr lang="en-US" sz="2200" dirty="0" smtClean="0">
+                <a:solidFill>
+                  <a:srgbClr val="000000"/>
+                </a:solidFill>
+              </a:rPr>
+              <a:t>of absorbers is plotted against the impact </a:t>
+            </a:r>
+            <a:r>
+              <a:rPr lang="en-US" sz="2200" dirty="0" smtClean="0">
+                <a:solidFill>
+                  <a:srgbClr val="000000"/>
+                </a:solidFill>
+              </a:rPr>
+              <a:t>parameter (</a:t>
+            </a:r>
+            <a:r>
+              <a:rPr lang="en-US" sz="2200" dirty="0" err="1" smtClean="0">
+                <a:solidFill>
+                  <a:srgbClr val="000000"/>
+                </a:solidFill>
+              </a:rPr>
+              <a:t>ρ</a:t>
+            </a:r>
+            <a:r>
+              <a:rPr lang="en-US" sz="2200" dirty="0" smtClean="0">
+                <a:solidFill>
+                  <a:srgbClr val="000000"/>
+                </a:solidFill>
+              </a:rPr>
+              <a:t>) </a:t>
+            </a:r>
+            <a:r>
+              <a:rPr lang="en-US" sz="2200" dirty="0" smtClean="0">
+                <a:solidFill>
+                  <a:srgbClr val="000000"/>
+                </a:solidFill>
+              </a:rPr>
+              <a:t>to each associated galaxy, normalized by the </a:t>
+            </a:r>
+            <a:r>
+              <a:rPr lang="en-US" sz="2200" dirty="0" smtClean="0">
+                <a:solidFill>
+                  <a:srgbClr val="000000"/>
+                </a:solidFill>
+              </a:rPr>
+              <a:t>galaxy </a:t>
+            </a:r>
+            <a:r>
+              <a:rPr lang="en-US" sz="2200" dirty="0" err="1" smtClean="0">
+                <a:solidFill>
+                  <a:srgbClr val="000000"/>
+                </a:solidFill>
+              </a:rPr>
+              <a:t>virial</a:t>
+            </a:r>
+            <a:r>
+              <a:rPr lang="en-US" sz="2200" dirty="0" smtClean="0">
+                <a:solidFill>
+                  <a:srgbClr val="000000"/>
+                </a:solidFill>
+              </a:rPr>
+              <a:t> radius (</a:t>
+            </a:r>
+            <a:r>
+              <a:rPr lang="en-US" sz="2200" dirty="0" err="1" smtClean="0">
+                <a:solidFill>
+                  <a:srgbClr val="000000"/>
+                </a:solidFill>
+              </a:rPr>
+              <a:t>R</a:t>
+            </a:r>
+            <a:r>
+              <a:rPr lang="en-US" sz="2200" baseline="-25000" dirty="0" err="1" smtClean="0">
+                <a:solidFill>
+                  <a:srgbClr val="000000"/>
+                </a:solidFill>
+              </a:rPr>
+              <a:t>vir</a:t>
+            </a:r>
+            <a:r>
+              <a:rPr lang="en-US" sz="2200" dirty="0" smtClean="0">
+                <a:solidFill>
+                  <a:srgbClr val="000000"/>
+                </a:solidFill>
+              </a:rPr>
+              <a:t>). </a:t>
+            </a:r>
+            <a:r>
+              <a:rPr lang="en-US" sz="2200" dirty="0" smtClean="0">
+                <a:solidFill>
+                  <a:srgbClr val="000000"/>
+                </a:solidFill>
+              </a:rPr>
+              <a:t>Color indicates if the absorber has lower velocity (blue) or higher velocity than the associated galaxy</a:t>
+            </a:r>
+            <a:r>
+              <a:rPr lang="en-US" sz="2200" dirty="0" smtClean="0">
+                <a:solidFill>
+                  <a:srgbClr val="000000"/>
+                </a:solidFill>
+              </a:rPr>
+              <a:t>. Weakly </a:t>
+            </a:r>
+            <a:r>
+              <a:rPr lang="en-US" sz="2200" dirty="0" smtClean="0">
+                <a:solidFill>
+                  <a:srgbClr val="000000"/>
+                </a:solidFill>
+              </a:rPr>
+              <a:t>absorbing systems occur at all impact parameters, however the average </a:t>
+            </a:r>
+            <a:r>
+              <a:rPr lang="en-US" sz="2200" dirty="0" smtClean="0">
+                <a:solidFill>
+                  <a:srgbClr val="000000"/>
+                </a:solidFill>
+              </a:rPr>
+              <a:t>EW tends to increase with decreasing </a:t>
+            </a:r>
+            <a:r>
+              <a:rPr lang="en-US" sz="2200" dirty="0" err="1" smtClean="0">
+                <a:solidFill>
+                  <a:srgbClr val="000000"/>
+                </a:solidFill>
+              </a:rPr>
+              <a:t>ρ</a:t>
+            </a:r>
+            <a:r>
+              <a:rPr lang="en-US" sz="2200" dirty="0">
+                <a:solidFill>
+                  <a:srgbClr val="000000"/>
+                </a:solidFill>
+              </a:rPr>
+              <a:t>/</a:t>
+            </a:r>
+            <a:r>
+              <a:rPr lang="en-US" sz="2200" dirty="0" err="1" smtClean="0">
+                <a:solidFill>
+                  <a:srgbClr val="000000"/>
+                </a:solidFill>
+              </a:rPr>
+              <a:t>R</a:t>
+            </a:r>
+            <a:r>
+              <a:rPr lang="en-US" sz="2200" baseline="-25000" dirty="0" err="1" smtClean="0">
+                <a:solidFill>
+                  <a:srgbClr val="000000"/>
+                </a:solidFill>
+              </a:rPr>
+              <a:t>vir</a:t>
             </a:r>
             <a:r>
               <a:rPr lang="en-US" sz="2400" dirty="0" smtClean="0">
@@ -4762,6 +4841,11 @@
               </a:rPr>
               <a:t>.</a:t>
             </a:r>
+            <a:endParaRPr lang="en-US" sz="2400" dirty="0" smtClean="0">
+              <a:solidFill>
+                <a:srgbClr val="000000"/>
+              </a:solidFill>
+            </a:endParaRPr>
           </a:p>
           <a:p>
             <a:endParaRPr lang="en-US" sz="2400" b="1" dirty="0">
@@ -4788,7 +4872,7 @@
         <p:spPr>
           <a:xfrm>
             <a:off x="18223555" y="26848775"/>
-            <a:ext cx="10789247" cy="1785104"/>
+            <a:ext cx="10789247" cy="1446550"/>
           </a:xfrm>
           <a:prstGeom prst="rect">
             <a:avLst/>
@@ -4909,15 +4993,7 @@
                   <a:srgbClr val="000000"/>
                 </a:solidFill>
               </a:rPr>
-              <a:t> Equivalent width plotted as a function of minor/major axis ratio. 33/45 absorbers appear to be associated with small axis ratio galaxies (b/a &lt; 0.6). This translates to 73% of absorbing systems occur near a galaxy with &gt;50</a:t>
-            </a:r>
-            <a:r>
-              <a:rPr lang="en-US" sz="2200" dirty="0">
-                <a:solidFill>
-                  <a:srgbClr val="000000"/>
-                </a:solidFill>
-              </a:rPr>
-              <a:t>°</a:t>
+              <a:t> </a:t>
             </a:r>
             <a:r>
               <a:rPr lang="en-US" sz="2200" dirty="0" smtClean="0">
@@ -4925,15 +5001,7 @@
                   <a:srgbClr val="000000"/>
                 </a:solidFill>
               </a:rPr>
-              <a:t> inclination angle. We also notice a dichotomy between gas that is red </a:t>
-            </a:r>
-            <a:r>
-              <a:rPr lang="en-US" sz="2200" dirty="0" err="1" smtClean="0">
-                <a:solidFill>
-                  <a:srgbClr val="000000"/>
-                </a:solidFill>
-              </a:rPr>
-              <a:t>vs</a:t>
+              <a:t>EW </a:t>
             </a:r>
             <a:r>
               <a:rPr lang="en-US" sz="2200" dirty="0" smtClean="0">
@@ -4941,15 +5009,7 @@
                   <a:srgbClr val="000000"/>
                 </a:solidFill>
               </a:rPr>
-              <a:t> blue shifted compared to the velocity of the associated galaxy (dashed black line). Average above line is </a:t>
-            </a:r>
-            <a:r>
-              <a:rPr lang="en-US" sz="2200" i="1" dirty="0" smtClean="0">
-                <a:solidFill>
-                  <a:srgbClr val="000000"/>
-                </a:solidFill>
-              </a:rPr>
-              <a:t>W =</a:t>
+              <a:t>plotted as a function of </a:t>
             </a:r>
             <a:r>
               <a:rPr lang="en-US" sz="2200" dirty="0" smtClean="0">
@@ -4957,15 +5017,15 @@
                   <a:srgbClr val="000000"/>
                 </a:solidFill>
               </a:rPr>
-              <a:t> 366 </a:t>
-            </a:r>
-            <a:r>
-              <a:rPr lang="en-US" sz="2200" i="1" dirty="0" err="1" smtClean="0">
-                <a:solidFill>
-                  <a:srgbClr val="000000"/>
-                </a:solidFill>
-              </a:rPr>
-              <a:t>mÅ</a:t>
+              <a:t>galaxy inclination, with 50</a:t>
+            </a:r>
+            <a:r>
+              <a:rPr lang="en-US" sz="2200" baseline="30000" dirty="0" smtClean="0">
+                <a:solidFill>
+                  <a:srgbClr val="000000"/>
+                </a:solidFill>
+              </a:rPr>
+              <a:t>th</a:t>
             </a:r>
             <a:r>
               <a:rPr lang="en-US" sz="2200" dirty="0" smtClean="0">
@@ -4973,31 +5033,15 @@
                   <a:srgbClr val="000000"/>
                 </a:solidFill>
               </a:rPr>
-              <a:t>, average below is </a:t>
-            </a:r>
-            <a:r>
-              <a:rPr lang="en-US" sz="2200" i="1" dirty="0" smtClean="0">
-                <a:solidFill>
-                  <a:srgbClr val="000000"/>
-                </a:solidFill>
-              </a:rPr>
-              <a:t>W </a:t>
-            </a:r>
-            <a:r>
-              <a:rPr lang="en-US" sz="2200" i="1" dirty="0">
-                <a:solidFill>
-                  <a:srgbClr val="000000"/>
-                </a:solidFill>
-              </a:rPr>
-              <a:t>=</a:t>
-            </a:r>
-            <a:r>
-              <a:rPr lang="en-US" sz="2200" dirty="0">
-                <a:solidFill>
-                  <a:srgbClr val="000000"/>
-                </a:solidFill>
-              </a:rPr>
-              <a:t> </a:t>
+              <a:t> and 90</a:t>
+            </a:r>
+            <a:r>
+              <a:rPr lang="en-US" sz="2200" baseline="30000" dirty="0" smtClean="0">
+                <a:solidFill>
+                  <a:srgbClr val="000000"/>
+                </a:solidFill>
+              </a:rPr>
+              <a:t>th</a:t>
             </a:r>
             <a:r>
               <a:rPr lang="en-US" sz="2200" dirty="0" smtClean="0">
@@ -5005,24 +5049,13 @@
                   <a:srgbClr val="000000"/>
                 </a:solidFill>
               </a:rPr>
-              <a:t> 192 </a:t>
-            </a:r>
-            <a:r>
-              <a:rPr lang="en-US" sz="2200" i="1" dirty="0" err="1" smtClean="0">
-                <a:solidFill>
-                  <a:srgbClr val="000000"/>
-                </a:solidFill>
-              </a:rPr>
-              <a:t>mÅ</a:t>
-            </a:r>
-            <a:r>
-              <a:rPr lang="en-US" sz="2200" dirty="0" smtClean="0">
-                <a:solidFill>
-                  <a:srgbClr val="000000"/>
-                </a:solidFill>
-              </a:rPr>
-              <a:t>.</a:t>
-            </a:r>
+              <a:t> percentile histograms shown in solid-black and dashed-purple. Most absorbers are found near highly inclined galaxies, and the highest EW absorbers occur between inclinations of 45 and 75 degrees. </a:t>
+            </a:r>
+            <a:endParaRPr lang="en-US" sz="2200" dirty="0" smtClean="0">
+              <a:solidFill>
+                <a:srgbClr val="000000"/>
+              </a:solidFill>
+            </a:endParaRPr>
           </a:p>
         </p:txBody>
       </p:sp>
@@ -5075,8 +5108,8 @@
         </p:nvSpPr>
         <p:spPr>
           <a:xfrm>
-            <a:off x="12082600" y="31507427"/>
-            <a:ext cx="2522401" cy="4154983"/>
+            <a:off x="12616488" y="30063182"/>
+            <a:ext cx="2210313" cy="7201971"/>
           </a:xfrm>
           <a:prstGeom prst="rect">
             <a:avLst/>
@@ -5103,7 +5136,15 @@
                   <a:srgbClr val="000000"/>
                 </a:solidFill>
               </a:rPr>
-              <a:t>Distributions of galaxy inclinations. Red depicts galaxies nearby red shifted absorption, blue depicts galaxies nearby blue shifted absorption, and green for all nearby galaxies (</a:t>
+              <a:t>Distributions of galaxy inclinations. Red depicts galaxies nearby red shifted absorption, blue depicts galaxies nearby blue shifted absorption, and green for </a:t>
+            </a:r>
+            <a:r>
+              <a:rPr lang="en-US" sz="2200" dirty="0" smtClean="0">
+                <a:solidFill>
+                  <a:srgbClr val="000000"/>
+                </a:solidFill>
+              </a:rPr>
+              <a:t>all galaxies with </a:t>
             </a:r>
             <a:r>
               <a:rPr lang="en-US" sz="2200" dirty="0" err="1" smtClean="0">
@@ -5119,7 +5160,23 @@
                   <a:srgbClr val="000000"/>
                 </a:solidFill>
               </a:rPr>
-              <a:t> &lt; 10000 km/s)</a:t>
+              <a:t> </a:t>
+            </a:r>
+            <a:r>
+              <a:rPr lang="en-US" sz="2200" dirty="0" smtClean="0">
+                <a:solidFill>
+                  <a:srgbClr val="000000"/>
+                </a:solidFill>
+              </a:rPr>
+              <a:t>&lt; 10000 km/</a:t>
+            </a:r>
+            <a:r>
+              <a:rPr lang="en-US" sz="2200" dirty="0" smtClean="0">
+                <a:solidFill>
+                  <a:srgbClr val="000000"/>
+                </a:solidFill>
+              </a:rPr>
+              <a:t>s. Absorbers are found preferentially around more highly inclined galaxies</a:t>
             </a:r>
             <a:endParaRPr lang="en-US" sz="2200" b="1" dirty="0">
               <a:solidFill>
@@ -5176,7 +5233,7 @@
         <p:spPr>
           <a:xfrm>
             <a:off x="15642818" y="30486185"/>
-            <a:ext cx="13301334" cy="7709802"/>
+            <a:ext cx="13301334" cy="8125301"/>
           </a:xfrm>
           <a:prstGeom prst="rect">
             <a:avLst/>
@@ -5294,7 +5351,31 @@
                   <a:prstClr val="black"/>
                 </a:solidFill>
               </a:rPr>
-              <a:t>We measure 154 Ly</a:t>
+              <a:t>We measure </a:t>
+            </a:r>
+            <a:r>
+              <a:rPr lang="en-US" sz="2700" u="none" baseline="0" dirty="0" smtClean="0">
+                <a:solidFill>
+                  <a:prstClr val="black"/>
+                </a:solidFill>
+              </a:rPr>
+              <a:t>51</a:t>
+            </a:r>
+            <a:r>
+              <a:rPr lang="en-US" sz="2700" u="none" dirty="0" smtClean="0">
+                <a:solidFill>
+                  <a:prstClr val="black"/>
+                </a:solidFill>
+              </a:rPr>
+              <a:t> </a:t>
+            </a:r>
+            <a:r>
+              <a:rPr lang="en-US" sz="2700" u="none" baseline="0" dirty="0" smtClean="0">
+                <a:solidFill>
+                  <a:prstClr val="black"/>
+                </a:solidFill>
+              </a:rPr>
+              <a:t>Ly</a:t>
             </a:r>
             <a:r>
               <a:rPr lang="en-US" sz="2700" dirty="0" smtClean="0">
@@ -5310,7 +5391,15 @@
                   <a:prstClr val="black"/>
                 </a:solidFill>
               </a:rPr>
-              <a:t> absorbing</a:t>
+              <a:t> </a:t>
+            </a:r>
+            <a:r>
+              <a:rPr lang="en-US" sz="2700" u="none" baseline="0" dirty="0" smtClean="0">
+                <a:solidFill>
+                  <a:prstClr val="black"/>
+                </a:solidFill>
+              </a:rPr>
+              <a:t>absorbing</a:t>
             </a:r>
             <a:r>
               <a:rPr lang="en-US" sz="2700" u="none" dirty="0" smtClean="0">
@@ -5334,23 +5423,55 @@
                   <a:prstClr val="black"/>
                 </a:solidFill>
               </a:rPr>
-              <a:t> = 0-10,000 km/s). 32% of absorbers can unambiguously be paired with a galaxy within 500 </a:t>
-            </a:r>
-            <a:r>
-              <a:rPr lang="en-US" sz="2700" u="none" dirty="0" err="1" smtClean="0">
+              <a:t> = 0-10,000 km/s</a:t>
+            </a:r>
+            <a:r>
+              <a:rPr lang="en-US" sz="2700" u="none" dirty="0" smtClean="0">
                 <a:solidFill>
                   <a:prstClr val="black"/>
                 </a:solidFill>
               </a:rPr>
+              <a:t>)</a:t>
+            </a:r>
+            <a:r>
+              <a:rPr lang="en-US" sz="2700" dirty="0" smtClean="0">
+                <a:solidFill>
+                  <a:prstClr val="black"/>
+                </a:solidFill>
+              </a:rPr>
+              <a:t>. Each has been paired with a large (diameter ≥ 25 </a:t>
+            </a:r>
+            <a:r>
+              <a:rPr lang="en-US" sz="2700" dirty="0" err="1" smtClean="0">
+                <a:solidFill>
+                  <a:prstClr val="black"/>
+                </a:solidFill>
+              </a:rPr>
               <a:t>kpc</a:t>
             </a:r>
             <a:r>
-              <a:rPr lang="en-US" sz="2700" u="none" dirty="0" smtClean="0">
+              <a:rPr lang="en-US" sz="2700" dirty="0" smtClean="0">
                 <a:solidFill>
                   <a:prstClr val="black"/>
                 </a:solidFill>
               </a:rPr>
-              <a:t> and 400 km/s, and 51% reside in relative void.</a:t>
+              <a:t>) galaxy found within a 500 </a:t>
+            </a:r>
+            <a:r>
+              <a:rPr lang="en-US" sz="2700" dirty="0" err="1" smtClean="0">
+                <a:solidFill>
+                  <a:prstClr val="black"/>
+                </a:solidFill>
+              </a:rPr>
+              <a:t>kpc</a:t>
+            </a:r>
+            <a:r>
+              <a:rPr lang="en-US" sz="2700" dirty="0" smtClean="0">
+                <a:solidFill>
+                  <a:prstClr val="black"/>
+                </a:solidFill>
+              </a:rPr>
+              <a:t> impact parameter and 400 km/s in velocity.</a:t>
             </a:r>
             <a:endParaRPr lang="en-US" sz="2700" dirty="0" smtClean="0">
               <a:solidFill>
@@ -5398,8 +5519,61 @@
                   <a:prstClr val="black"/>
                 </a:solidFill>
               </a:rPr>
-              <a:t>increases with decreasing impact parameter ONLY when normalized by galaxy size.</a:t>
-            </a:r>
+              <a:t>increases with decreasing impact parameter </a:t>
+            </a:r>
+            <a:r>
+              <a:rPr lang="en-US" sz="2700" dirty="0" smtClean="0">
+                <a:solidFill>
+                  <a:prstClr val="black"/>
+                </a:solidFill>
+              </a:rPr>
+              <a:t>most </a:t>
+            </a:r>
+            <a:r>
+              <a:rPr lang="en-US" sz="2700" dirty="0" smtClean="0">
+                <a:solidFill>
+                  <a:prstClr val="black"/>
+                </a:solidFill>
+              </a:rPr>
+              <a:t>strongly </a:t>
+            </a:r>
+            <a:r>
+              <a:rPr lang="en-US" sz="2700" dirty="0" smtClean="0">
+                <a:solidFill>
+                  <a:prstClr val="black"/>
+                </a:solidFill>
+              </a:rPr>
+              <a:t>when </a:t>
+            </a:r>
+            <a:r>
+              <a:rPr lang="en-US" sz="2700" dirty="0" smtClean="0">
+                <a:solidFill>
+                  <a:prstClr val="black"/>
+                </a:solidFill>
+              </a:rPr>
+              <a:t>normalized by galaxy </a:t>
+            </a:r>
+            <a:r>
+              <a:rPr lang="en-US" sz="2700" dirty="0" err="1" smtClean="0">
+                <a:solidFill>
+                  <a:prstClr val="black"/>
+                </a:solidFill>
+              </a:rPr>
+              <a:t>virial</a:t>
+            </a:r>
+            <a:r>
+              <a:rPr lang="en-US" sz="2700" dirty="0" smtClean="0">
+                <a:solidFill>
+                  <a:prstClr val="black"/>
+                </a:solidFill>
+              </a:rPr>
+              <a:t> radius.</a:t>
+            </a:r>
+            <a:endParaRPr lang="en-US" sz="2700" dirty="0" smtClean="0">
+              <a:solidFill>
+                <a:prstClr val="black"/>
+              </a:solidFill>
+            </a:endParaRPr>
           </a:p>
           <a:p>
             <a:pPr>
@@ -5423,8 +5597,37 @@
                   <a:prstClr val="black"/>
                 </a:solidFill>
               </a:rPr>
-              <a:t>73% of galaxies associated with Lyα absorption are highly inclined (&gt;50°).</a:t>
-            </a:r>
+              <a:t>71% </a:t>
+            </a:r>
+            <a:r>
+              <a:rPr lang="en-US" sz="2700" dirty="0" smtClean="0">
+                <a:solidFill>
+                  <a:prstClr val="black"/>
+                </a:solidFill>
+              </a:rPr>
+              <a:t>of galaxies associated with Lyα absorption are highly inclined (&gt;50°</a:t>
+            </a:r>
+            <a:r>
+              <a:rPr lang="en-US" sz="2700" dirty="0" smtClean="0">
+                <a:solidFill>
+                  <a:prstClr val="black"/>
+                </a:solidFill>
+              </a:rPr>
+              <a:t>), compared to 56% of all galaxies in </a:t>
+            </a:r>
+            <a:r>
+              <a:rPr lang="en-US" sz="2700" smtClean="0">
+                <a:solidFill>
+                  <a:prstClr val="black"/>
+                </a:solidFill>
+              </a:rPr>
+              <a:t>this redshift range.</a:t>
+            </a:r>
+            <a:endParaRPr lang="en-US" sz="2700" dirty="0" smtClean="0">
+              <a:solidFill>
+                <a:prstClr val="black"/>
+              </a:solidFill>
+            </a:endParaRPr>
           </a:p>
           <a:p>
             <a:pPr marL="285750" indent="-285750">
@@ -5814,27 +6017,603 @@
       </p:sp>
       <p:pic>
         <p:nvPicPr>
-          <p:cNvPr id="15" name="Picture 14" descr="hist(cos(inclination))_dif_final2_p1.pdf"/>
+          <p:cNvPr id="13" name="Picture 12" descr="map_SDSSJ130524.30+035731.0_7039.pdf"/>
           <p:cNvPicPr>
-            <a:picLocks/>
+            <a:picLocks noChangeAspect="1"/>
           </p:cNvPicPr>
           <p:nvPr/>
         </p:nvPicPr>
         <p:blipFill rotWithShape="1">
-          <a:blip r:embed="rId10">
+          <a:blip r:embed="rId6">
             <a:extLst>
               <a:ext uri="{28A0092B-C50C-407E-A947-70E740481C1C}">
                 <a14:useLocalDpi xmlns:a14="http://schemas.microsoft.com/office/drawing/2010/main" val="0"/>
               </a:ext>
             </a:extLst>
           </a:blip>
-          <a:srcRect l="7993" r="7934"/>
+          <a:srcRect l="5481" t="8037" r="11163" b="3899"/>
           <a:stretch/>
         </p:blipFill>
         <p:spPr>
           <a:xfrm>
-            <a:off x="1972420" y="29652060"/>
-            <a:ext cx="9993943" cy="2423160"/>
+            <a:off x="2104800" y="7158524"/>
+            <a:ext cx="7189595" cy="6329697"/>
+          </a:xfrm>
+          <a:prstGeom prst="rect">
+            <a:avLst/>
+          </a:prstGeom>
+        </p:spPr>
+      </p:pic>
+      <p:sp>
+        <p:nvSpPr>
+          <p:cNvPr id="68" name="TextBox 67"/>
+          <p:cNvSpPr txBox="1"/>
+          <p:nvPr/>
+        </p:nvSpPr>
+        <p:spPr>
+          <a:xfrm>
+            <a:off x="1149430" y="37809490"/>
+            <a:ext cx="28115557" cy="677108"/>
+          </a:xfrm>
+          <a:prstGeom prst="rect">
+            <a:avLst/>
+          </a:prstGeom>
+          <a:noFill/>
+        </p:spPr>
+        <p:txBody>
+          <a:bodyPr wrap="square" rtlCol="0">
+            <a:spAutoFit/>
+          </a:bodyPr>
+          <a:lstStyle/>
+          <a:p>
+            <a:r>
+              <a:rPr lang="en-US" sz="1300" dirty="0" smtClean="0">
+                <a:solidFill>
+                  <a:srgbClr val="FFFFFF"/>
+                </a:solidFill>
+              </a:rPr>
+              <a:t>Acknowledgements:  </a:t>
+            </a:r>
+            <a:r>
+              <a:rPr lang="en-US" sz="1300" dirty="0">
+                <a:solidFill>
+                  <a:srgbClr val="FFFFFF"/>
+                </a:solidFill>
+              </a:rPr>
+              <a:t>This research has made use of the NASA/IPAC Extragalactic Database (NED) which is operated by the Jet Propulsion Laboratory, California Institute of Technology, under contract with the National Aeronautics and Space Administration</a:t>
+            </a:r>
+            <a:r>
+              <a:rPr lang="en-US" sz="1300" dirty="0" smtClean="0">
+                <a:solidFill>
+                  <a:srgbClr val="FFFFFF"/>
+                </a:solidFill>
+              </a:rPr>
+              <a:t>.</a:t>
+            </a:r>
+          </a:p>
+          <a:p>
+            <a:r>
+              <a:rPr lang="en-US" sz="1300" dirty="0" smtClean="0">
+                <a:solidFill>
+                  <a:srgbClr val="FFFFFF"/>
+                </a:solidFill>
+              </a:rPr>
+              <a:t>References: </a:t>
+            </a:r>
+            <a:r>
+              <a:rPr lang="tr-TR" sz="1300" dirty="0" err="1" smtClean="0">
+                <a:solidFill>
+                  <a:srgbClr val="FFFFFF"/>
+                </a:solidFill>
+              </a:rPr>
+              <a:t>Danforth</a:t>
+            </a:r>
+            <a:r>
+              <a:rPr lang="tr-TR" sz="1300" dirty="0" smtClean="0">
+                <a:solidFill>
+                  <a:srgbClr val="FFFFFF"/>
+                </a:solidFill>
+              </a:rPr>
+              <a:t> et al. 2014, </a:t>
+            </a:r>
+            <a:r>
+              <a:rPr lang="en-US" sz="1300" dirty="0" smtClean="0">
+                <a:solidFill>
+                  <a:srgbClr val="FFFFFF"/>
+                </a:solidFill>
+              </a:rPr>
+              <a:t>arXiv1402.2655D; </a:t>
+            </a:r>
+            <a:r>
+              <a:rPr lang="pl-PL" sz="1300" dirty="0">
+                <a:solidFill>
+                  <a:srgbClr val="FFFFFF"/>
+                </a:solidFill>
+              </a:rPr>
+              <a:t>Kacprzak, G.G., et al. 2012, </a:t>
+            </a:r>
+            <a:r>
+              <a:rPr lang="pl-PL" sz="1300" dirty="0" err="1">
+                <a:solidFill>
+                  <a:srgbClr val="FFFFFF"/>
+                </a:solidFill>
+              </a:rPr>
+              <a:t>ApJL</a:t>
+            </a:r>
+            <a:r>
+              <a:rPr lang="pl-PL" sz="1300" dirty="0">
+                <a:solidFill>
+                  <a:srgbClr val="FFFFFF"/>
+                </a:solidFill>
+              </a:rPr>
+              <a:t>, 760, </a:t>
+            </a:r>
+            <a:r>
+              <a:rPr lang="pl-PL" sz="1300" dirty="0" smtClean="0">
+                <a:solidFill>
+                  <a:srgbClr val="FFFFFF"/>
+                </a:solidFill>
+              </a:rPr>
+              <a:t>L7; </a:t>
+            </a:r>
+            <a:r>
+              <a:rPr lang="da-DK" sz="1300" dirty="0" err="1" smtClean="0">
+                <a:solidFill>
+                  <a:srgbClr val="FFFFFF"/>
+                </a:solidFill>
+              </a:rPr>
+              <a:t>McLin</a:t>
+            </a:r>
+            <a:r>
+              <a:rPr lang="da-DK" sz="1300" dirty="0">
+                <a:solidFill>
+                  <a:srgbClr val="FFFFFF"/>
+                </a:solidFill>
+              </a:rPr>
+              <a:t>, K.  et al. 2002, </a:t>
+            </a:r>
+            <a:r>
+              <a:rPr lang="da-DK" sz="1300" dirty="0" err="1">
+                <a:solidFill>
+                  <a:srgbClr val="FFFFFF"/>
+                </a:solidFill>
+              </a:rPr>
+              <a:t>ApJL</a:t>
+            </a:r>
+            <a:r>
+              <a:rPr lang="da-DK" sz="1300" dirty="0">
+                <a:solidFill>
+                  <a:srgbClr val="FFFFFF"/>
+                </a:solidFill>
+              </a:rPr>
+              <a:t>, 574, </a:t>
+            </a:r>
+            <a:r>
+              <a:rPr lang="da-DK" sz="1300" dirty="0" smtClean="0">
+                <a:solidFill>
+                  <a:srgbClr val="FFFFFF"/>
+                </a:solidFill>
+              </a:rPr>
+              <a:t>L115; </a:t>
+            </a:r>
+            <a:r>
+              <a:rPr lang="nb-NO" sz="1300" dirty="0" err="1">
+                <a:solidFill>
+                  <a:srgbClr val="FFFFFF"/>
+                </a:solidFill>
+              </a:rPr>
+              <a:t>Oppenheimer</a:t>
+            </a:r>
+            <a:r>
+              <a:rPr lang="nb-NO" sz="1300" dirty="0">
+                <a:solidFill>
+                  <a:srgbClr val="FFFFFF"/>
+                </a:solidFill>
+              </a:rPr>
+              <a:t>, B.D. et al. 2012, MNRAS, 420, </a:t>
+            </a:r>
+            <a:r>
+              <a:rPr lang="nb-NO" sz="1300" dirty="0" smtClean="0">
+                <a:solidFill>
+                  <a:srgbClr val="FFFFFF"/>
+                </a:solidFill>
+              </a:rPr>
+              <a:t>829</a:t>
+            </a:r>
+            <a:r>
+              <a:rPr lang="da-DK" sz="1300" dirty="0" smtClean="0">
+                <a:solidFill>
+                  <a:srgbClr val="FFFFFF"/>
+                </a:solidFill>
+              </a:rPr>
+              <a:t>; </a:t>
+            </a:r>
+            <a:r>
+              <a:rPr lang="pl-PL" sz="1300" dirty="0">
+                <a:solidFill>
+                  <a:srgbClr val="FFFFFF"/>
+                </a:solidFill>
+              </a:rPr>
+              <a:t>; </a:t>
+            </a:r>
+            <a:r>
+              <a:rPr lang="sv-SE" sz="1300" dirty="0" err="1">
+                <a:solidFill>
+                  <a:srgbClr val="FFFFFF"/>
+                </a:solidFill>
+              </a:rPr>
+              <a:t>Prochaska</a:t>
+            </a:r>
+            <a:r>
+              <a:rPr lang="sv-SE" sz="1300" dirty="0">
+                <a:solidFill>
+                  <a:srgbClr val="FFFFFF"/>
+                </a:solidFill>
+              </a:rPr>
+              <a:t>, J.X. 2011, </a:t>
+            </a:r>
+            <a:r>
+              <a:rPr lang="sv-SE" sz="1300" dirty="0" err="1">
+                <a:solidFill>
+                  <a:srgbClr val="FFFFFF"/>
+                </a:solidFill>
+              </a:rPr>
+              <a:t>ApJ</a:t>
+            </a:r>
+            <a:r>
+              <a:rPr lang="sv-SE" sz="1300" dirty="0">
+                <a:solidFill>
+                  <a:srgbClr val="FFFFFF"/>
+                </a:solidFill>
+              </a:rPr>
+              <a:t>, 740, p.91; </a:t>
+            </a:r>
+            <a:r>
+              <a:rPr lang="da-DK" sz="1300" dirty="0" err="1">
+                <a:solidFill>
+                  <a:srgbClr val="FFFFFF"/>
+                </a:solidFill>
+              </a:rPr>
+              <a:t>Rudie</a:t>
+            </a:r>
+            <a:r>
+              <a:rPr lang="da-DK" sz="1300" dirty="0">
+                <a:solidFill>
+                  <a:srgbClr val="FFFFFF"/>
+                </a:solidFill>
+              </a:rPr>
+              <a:t>, G.C., et al. 2012, </a:t>
+            </a:r>
+            <a:r>
+              <a:rPr lang="da-DK" sz="1300" dirty="0" err="1">
+                <a:solidFill>
+                  <a:srgbClr val="FFFFFF"/>
+                </a:solidFill>
+              </a:rPr>
+              <a:t>ApJ</a:t>
+            </a:r>
+            <a:r>
+              <a:rPr lang="da-DK" sz="1300" dirty="0">
+                <a:solidFill>
+                  <a:srgbClr val="FFFFFF"/>
+                </a:solidFill>
+              </a:rPr>
+              <a:t>, 750, p.67; </a:t>
+            </a:r>
+            <a:r>
+              <a:rPr lang="en-US" sz="1300" dirty="0" smtClean="0">
+                <a:solidFill>
+                  <a:srgbClr val="FFFFFF"/>
+                </a:solidFill>
+              </a:rPr>
+              <a:t>Shull</a:t>
+            </a:r>
+            <a:r>
+              <a:rPr lang="en-US" sz="1300" dirty="0">
+                <a:solidFill>
+                  <a:srgbClr val="FFFFFF"/>
+                </a:solidFill>
+              </a:rPr>
+              <a:t>, J.M., Smith, </a:t>
+            </a:r>
+            <a:r>
+              <a:rPr lang="en-US" sz="1300" dirty="0" smtClean="0">
+                <a:solidFill>
+                  <a:srgbClr val="FFFFFF"/>
+                </a:solidFill>
+              </a:rPr>
+              <a:t>B.D</a:t>
+            </a:r>
+            <a:r>
+              <a:rPr lang="en-US" sz="1300" dirty="0">
+                <a:solidFill>
+                  <a:srgbClr val="FFFFFF"/>
+                </a:solidFill>
+              </a:rPr>
+              <a:t>., </a:t>
+            </a:r>
+            <a:r>
+              <a:rPr lang="en-US" sz="1300" dirty="0" smtClean="0">
+                <a:solidFill>
+                  <a:srgbClr val="FFFFFF"/>
+                </a:solidFill>
+              </a:rPr>
+              <a:t>&amp; </a:t>
+            </a:r>
+            <a:r>
+              <a:rPr lang="en-US" sz="1300" dirty="0">
+                <a:solidFill>
+                  <a:srgbClr val="FFFFFF"/>
+                </a:solidFill>
+              </a:rPr>
+              <a:t>Danforth, C.W. 2012, </a:t>
+            </a:r>
+            <a:r>
+              <a:rPr lang="en-US" sz="1300" dirty="0" err="1">
+                <a:solidFill>
+                  <a:srgbClr val="FFFFFF"/>
+                </a:solidFill>
+              </a:rPr>
+              <a:t>ApJ</a:t>
+            </a:r>
+            <a:r>
+              <a:rPr lang="en-US" sz="1300" dirty="0">
+                <a:solidFill>
+                  <a:srgbClr val="FFFFFF"/>
+                </a:solidFill>
+              </a:rPr>
+              <a:t> 759, </a:t>
+            </a:r>
+            <a:r>
+              <a:rPr lang="en-US" sz="1300" dirty="0" smtClean="0">
+                <a:solidFill>
+                  <a:srgbClr val="FFFFFF"/>
+                </a:solidFill>
+              </a:rPr>
+              <a:t>23; </a:t>
+            </a:r>
+            <a:r>
+              <a:rPr lang="da-DK" sz="1300" dirty="0" err="1">
+                <a:solidFill>
+                  <a:srgbClr val="FFFFFF"/>
+                </a:solidFill>
+              </a:rPr>
+              <a:t>Tully</a:t>
+            </a:r>
+            <a:r>
+              <a:rPr lang="da-DK" sz="1300" dirty="0">
+                <a:solidFill>
+                  <a:srgbClr val="FFFFFF"/>
+                </a:solidFill>
+              </a:rPr>
+              <a:t>, R.B. et al. 2013, AJ, 146, 86; </a:t>
+            </a:r>
+            <a:r>
+              <a:rPr lang="tr-TR" sz="1300" dirty="0" err="1" smtClean="0">
+                <a:solidFill>
+                  <a:srgbClr val="FFFFFF"/>
+                </a:solidFill>
+              </a:rPr>
+              <a:t>Wakker</a:t>
+            </a:r>
+            <a:r>
+              <a:rPr lang="tr-TR" sz="1300" dirty="0" smtClean="0">
+                <a:solidFill>
+                  <a:srgbClr val="FFFFFF"/>
+                </a:solidFill>
+              </a:rPr>
+              <a:t> </a:t>
+            </a:r>
+            <a:r>
+              <a:rPr lang="tr-TR" sz="1300" dirty="0">
+                <a:solidFill>
+                  <a:srgbClr val="FFFFFF"/>
+                </a:solidFill>
+              </a:rPr>
+              <a:t>B.P. &amp; </a:t>
+            </a:r>
+            <a:r>
+              <a:rPr lang="tr-TR" sz="1300" dirty="0" err="1">
+                <a:solidFill>
+                  <a:srgbClr val="FFFFFF"/>
+                </a:solidFill>
+              </a:rPr>
+              <a:t>Savage</a:t>
+            </a:r>
+            <a:r>
+              <a:rPr lang="tr-TR" sz="1300" dirty="0">
+                <a:solidFill>
+                  <a:srgbClr val="FFFFFF"/>
+                </a:solidFill>
+              </a:rPr>
+              <a:t> B.D. 2009, </a:t>
+            </a:r>
+            <a:r>
+              <a:rPr lang="tr-TR" sz="1300" dirty="0" err="1">
+                <a:solidFill>
+                  <a:srgbClr val="FFFFFF"/>
+                </a:solidFill>
+              </a:rPr>
+              <a:t>ApJs</a:t>
+            </a:r>
+            <a:r>
+              <a:rPr lang="tr-TR" sz="1300" dirty="0">
+                <a:solidFill>
+                  <a:srgbClr val="FFFFFF"/>
+                </a:solidFill>
+              </a:rPr>
+              <a:t>, 182, p.</a:t>
+            </a:r>
+            <a:r>
+              <a:rPr lang="tr-TR" sz="1300" dirty="0" smtClean="0">
+                <a:solidFill>
+                  <a:srgbClr val="FFFFFF"/>
+                </a:solidFill>
+              </a:rPr>
+              <a:t>378</a:t>
+            </a:r>
+            <a:endParaRPr lang="en-US" sz="1300" dirty="0">
+              <a:solidFill>
+                <a:srgbClr val="FFFFFF"/>
+              </a:solidFill>
+            </a:endParaRPr>
+          </a:p>
+          <a:p>
+            <a:endParaRPr lang="en-US" sz="1200" dirty="0">
+              <a:solidFill>
+                <a:srgbClr val="FFFFFF"/>
+              </a:solidFill>
+            </a:endParaRPr>
+          </a:p>
+        </p:txBody>
+      </p:sp>
+      <p:pic>
+        <p:nvPicPr>
+          <p:cNvPr id="8" name="Picture 7" descr="SDSSJ130524.30+035731.0_system-7039_cut.jpg"/>
+          <p:cNvPicPr>
+            <a:picLocks noChangeAspect="1"/>
+          </p:cNvPicPr>
+          <p:nvPr/>
+        </p:nvPicPr>
+        <p:blipFill>
+          <a:blip r:embed="rId7">
+            <a:extLst>
+              <a:ext uri="{28A0092B-C50C-407E-A947-70E740481C1C}">
+                <a14:useLocalDpi xmlns:a14="http://schemas.microsoft.com/office/drawing/2010/main" val="0"/>
+              </a:ext>
+            </a:extLst>
+          </a:blip>
+          <a:stretch>
+            <a:fillRect/>
+          </a:stretch>
+        </p:blipFill>
+        <p:spPr>
+          <a:xfrm>
+            <a:off x="3241048" y="13480168"/>
+            <a:ext cx="4109151" cy="2328686"/>
+          </a:xfrm>
+          <a:prstGeom prst="rect">
+            <a:avLst/>
+          </a:prstGeom>
+        </p:spPr>
+      </p:pic>
+      <p:cxnSp>
+        <p:nvCxnSpPr>
+          <p:cNvPr id="41" name="Straight Connector 40"/>
+          <p:cNvCxnSpPr/>
+          <p:nvPr/>
+        </p:nvCxnSpPr>
+        <p:spPr>
+          <a:xfrm flipH="1">
+            <a:off x="3637644" y="10197155"/>
+            <a:ext cx="1657980" cy="3355023"/>
+          </a:xfrm>
+          <a:prstGeom prst="line">
+            <a:avLst/>
+          </a:prstGeom>
+        </p:spPr>
+        <p:style>
+          <a:lnRef idx="2">
+            <a:schemeClr val="dk1"/>
+          </a:lnRef>
+          <a:fillRef idx="0">
+            <a:schemeClr val="dk1"/>
+          </a:fillRef>
+          <a:effectRef idx="1">
+            <a:schemeClr val="dk1"/>
+          </a:effectRef>
+          <a:fontRef idx="minor">
+            <a:schemeClr val="tx1"/>
+          </a:fontRef>
+        </p:style>
+      </p:cxnSp>
+      <p:cxnSp>
+        <p:nvCxnSpPr>
+          <p:cNvPr id="43" name="Straight Connector 42"/>
+          <p:cNvCxnSpPr/>
+          <p:nvPr/>
+        </p:nvCxnSpPr>
+        <p:spPr>
+          <a:xfrm>
+            <a:off x="5481437" y="10197155"/>
+            <a:ext cx="1687418" cy="3355023"/>
+          </a:xfrm>
+          <a:prstGeom prst="line">
+            <a:avLst/>
+          </a:prstGeom>
+        </p:spPr>
+        <p:style>
+          <a:lnRef idx="2">
+            <a:schemeClr val="dk1"/>
+          </a:lnRef>
+          <a:fillRef idx="0">
+            <a:schemeClr val="dk1"/>
+          </a:fillRef>
+          <a:effectRef idx="1">
+            <a:schemeClr val="dk1"/>
+          </a:effectRef>
+          <a:fontRef idx="minor">
+            <a:schemeClr val="tx1"/>
+          </a:fontRef>
+        </p:style>
+      </p:cxnSp>
+      <p:sp>
+        <p:nvSpPr>
+          <p:cNvPr id="27" name="TextBox 26"/>
+          <p:cNvSpPr txBox="1"/>
+          <p:nvPr/>
+        </p:nvSpPr>
+        <p:spPr>
+          <a:xfrm>
+            <a:off x="3209521" y="6836437"/>
+            <a:ext cx="4793854" cy="461665"/>
+          </a:xfrm>
+          <a:prstGeom prst="rect">
+            <a:avLst/>
+          </a:prstGeom>
+          <a:noFill/>
+        </p:spPr>
+        <p:txBody>
+          <a:bodyPr wrap="square" rtlCol="0">
+            <a:spAutoFit/>
+          </a:bodyPr>
+          <a:lstStyle/>
+          <a:p>
+            <a:r>
+              <a:rPr lang="en-US" sz="2400" dirty="0" err="1" smtClean="0"/>
+              <a:t>Lya</a:t>
+            </a:r>
+            <a:r>
+              <a:rPr lang="en-US" sz="2400" dirty="0" smtClean="0"/>
+              <a:t> in SDSSJ130524.30+035731.0 </a:t>
+            </a:r>
+            <a:endParaRPr lang="en-US" sz="2400" dirty="0"/>
+          </a:p>
+        </p:txBody>
+      </p:sp>
+      <p:pic>
+        <p:nvPicPr>
+          <p:cNvPr id="30" name="Picture 29" descr="map_MRK290_3207.pdf"/>
+          <p:cNvPicPr>
+            <a:picLocks noChangeAspect="1"/>
+          </p:cNvPicPr>
+          <p:nvPr/>
+        </p:nvPicPr>
+        <p:blipFill rotWithShape="1">
+          <a:blip r:embed="rId8">
+            <a:extLst>
+              <a:ext uri="{28A0092B-C50C-407E-A947-70E740481C1C}">
+                <a14:useLocalDpi xmlns:a14="http://schemas.microsoft.com/office/drawing/2010/main" val="0"/>
+              </a:ext>
+            </a:extLst>
+          </a:blip>
+          <a:srcRect l="5776" t="6790" r="11219" b="4145"/>
+          <a:stretch/>
+        </p:blipFill>
+        <p:spPr>
+          <a:xfrm>
+            <a:off x="21038593" y="7124200"/>
+            <a:ext cx="7197963" cy="6436282"/>
           </a:xfrm>
           <a:prstGeom prst="rect">
             <a:avLst/>
@@ -5843,7 +6622,161 @@
       </p:pic>
       <p:pic>
         <p:nvPicPr>
-          <p:cNvPr id="19" name="Picture 18" descr="W_vs_inclination_final2.pdf"/>
+          <p:cNvPr id="32" name="Picture 31" descr="MRK290_system-3192_cut.jpg"/>
+          <p:cNvPicPr>
+            <a:picLocks noChangeAspect="1"/>
+          </p:cNvPicPr>
+          <p:nvPr/>
+        </p:nvPicPr>
+        <p:blipFill>
+          <a:blip r:embed="rId9">
+            <a:extLst>
+              <a:ext uri="{28A0092B-C50C-407E-A947-70E740481C1C}">
+                <a14:useLocalDpi xmlns:a14="http://schemas.microsoft.com/office/drawing/2010/main" val="0"/>
+              </a:ext>
+            </a:extLst>
+          </a:blip>
+          <a:stretch>
+            <a:fillRect/>
+          </a:stretch>
+        </p:blipFill>
+        <p:spPr>
+          <a:xfrm>
+            <a:off x="22307464" y="13530600"/>
+            <a:ext cx="3867260" cy="2318344"/>
+          </a:xfrm>
+          <a:prstGeom prst="rect">
+            <a:avLst/>
+          </a:prstGeom>
+        </p:spPr>
+      </p:pic>
+      <p:cxnSp>
+        <p:nvCxnSpPr>
+          <p:cNvPr id="25" name="Straight Connector 24"/>
+          <p:cNvCxnSpPr/>
+          <p:nvPr/>
+        </p:nvCxnSpPr>
+        <p:spPr>
+          <a:xfrm>
+            <a:off x="24376258" y="10260219"/>
+            <a:ext cx="1709771" cy="3340490"/>
+          </a:xfrm>
+          <a:prstGeom prst="line">
+            <a:avLst/>
+          </a:prstGeom>
+        </p:spPr>
+        <p:style>
+          <a:lnRef idx="2">
+            <a:schemeClr val="dk1"/>
+          </a:lnRef>
+          <a:fillRef idx="0">
+            <a:schemeClr val="dk1"/>
+          </a:fillRef>
+          <a:effectRef idx="1">
+            <a:schemeClr val="dk1"/>
+          </a:effectRef>
+          <a:fontRef idx="minor">
+            <a:schemeClr val="tx1"/>
+          </a:fontRef>
+        </p:style>
+      </p:cxnSp>
+      <p:cxnSp>
+        <p:nvCxnSpPr>
+          <p:cNvPr id="24" name="Straight Connector 23"/>
+          <p:cNvCxnSpPr/>
+          <p:nvPr/>
+        </p:nvCxnSpPr>
+        <p:spPr>
+          <a:xfrm flipH="1">
+            <a:off x="22559335" y="10260219"/>
+            <a:ext cx="1681760" cy="3340490"/>
+          </a:xfrm>
+          <a:prstGeom prst="line">
+            <a:avLst/>
+          </a:prstGeom>
+        </p:spPr>
+        <p:style>
+          <a:lnRef idx="2">
+            <a:schemeClr val="dk1"/>
+          </a:lnRef>
+          <a:fillRef idx="0">
+            <a:schemeClr val="dk1"/>
+          </a:fillRef>
+          <a:effectRef idx="1">
+            <a:schemeClr val="dk1"/>
+          </a:effectRef>
+          <a:fontRef idx="minor">
+            <a:schemeClr val="tx1"/>
+          </a:fontRef>
+        </p:style>
+      </p:cxnSp>
+      <p:sp>
+        <p:nvSpPr>
+          <p:cNvPr id="78" name="TextBox 77"/>
+          <p:cNvSpPr txBox="1"/>
+          <p:nvPr/>
+        </p:nvSpPr>
+        <p:spPr>
+          <a:xfrm>
+            <a:off x="23227158" y="6893367"/>
+            <a:ext cx="2027873" cy="461665"/>
+          </a:xfrm>
+          <a:prstGeom prst="rect">
+            <a:avLst/>
+          </a:prstGeom>
+          <a:noFill/>
+        </p:spPr>
+        <p:txBody>
+          <a:bodyPr wrap="square" rtlCol="0">
+            <a:spAutoFit/>
+          </a:bodyPr>
+          <a:lstStyle/>
+          <a:p>
+            <a:r>
+              <a:rPr lang="en-US" sz="2400" dirty="0" err="1" smtClean="0"/>
+              <a:t>Lya</a:t>
+            </a:r>
+            <a:r>
+              <a:rPr lang="en-US" sz="2400" dirty="0" smtClean="0"/>
+              <a:t> in MRK290</a:t>
+            </a:r>
+            <a:endParaRPr lang="en-US" sz="2400" dirty="0"/>
+          </a:p>
+        </p:txBody>
+      </p:sp>
+      <p:pic>
+        <p:nvPicPr>
+          <p:cNvPr id="79" name="Picture 78" descr="W(impact_vir)_avgHistograms.pdf"/>
+          <p:cNvPicPr>
+            <a:picLocks noChangeAspect="1"/>
+          </p:cNvPicPr>
+          <p:nvPr/>
+        </p:nvPicPr>
+        <p:blipFill>
+          <a:blip r:embed="rId10">
+            <a:extLst>
+              <a:ext uri="{28A0092B-C50C-407E-A947-70E740481C1C}">
+                <a14:useLocalDpi xmlns:a14="http://schemas.microsoft.com/office/drawing/2010/main" val="0"/>
+              </a:ext>
+            </a:extLst>
+          </a:blip>
+          <a:stretch>
+            <a:fillRect/>
+          </a:stretch>
+        </p:blipFill>
+        <p:spPr>
+          <a:xfrm>
+            <a:off x="1211386" y="20351706"/>
+            <a:ext cx="10292946" cy="7940273"/>
+          </a:xfrm>
+          <a:prstGeom prst="rect">
+            <a:avLst/>
+          </a:prstGeom>
+        </p:spPr>
+      </p:pic>
+      <p:pic>
+        <p:nvPicPr>
+          <p:cNvPr id="82" name="Picture 81" descr="hist(Impact_vir_dif)_bin_0.2.pdf"/>
           <p:cNvPicPr>
             <a:picLocks noChangeAspect="1"/>
           </p:cNvPicPr>
@@ -5857,13 +6790,13 @@
               </a:ext>
             </a:extLst>
           </a:blip>
-          <a:srcRect l="2527" t="7388" r="8294"/>
+          <a:srcRect l="1447" t="5598" b="10724"/>
           <a:stretch/>
         </p:blipFill>
         <p:spPr>
           <a:xfrm>
-            <a:off x="17661737" y="18625270"/>
-            <a:ext cx="10739826" cy="8364964"/>
+            <a:off x="1860688" y="18848962"/>
+            <a:ext cx="9530911" cy="1618488"/>
           </a:xfrm>
           <a:prstGeom prst="rect">
             <a:avLst/>
@@ -5872,9 +6805,9 @@
       </p:pic>
       <p:pic>
         <p:nvPicPr>
-          <p:cNvPr id="17" name="Picture 16" descr="hist(cos(inclination))_dif_final2_p2.pdf"/>
+          <p:cNvPr id="83" name="Picture 82" descr="hist(lyaW_dif_all).pdf"/>
           <p:cNvPicPr>
-            <a:picLocks/>
+            <a:picLocks noChangeAspect="1"/>
           </p:cNvPicPr>
           <p:nvPr/>
         </p:nvPicPr>
@@ -5886,13 +6819,13 @@
               </a:ext>
             </a:extLst>
           </a:blip>
-          <a:srcRect l="7993" r="7934"/>
+          <a:srcRect t="4406" r="4465" b="6404"/>
           <a:stretch/>
         </p:blipFill>
         <p:spPr>
-          <a:xfrm>
-            <a:off x="1972420" y="32274551"/>
-            <a:ext cx="9993943" cy="2423160"/>
+          <a:xfrm rot="5400000">
+            <a:off x="7967341" y="22934576"/>
+            <a:ext cx="8374297" cy="1563624"/>
           </a:xfrm>
           <a:prstGeom prst="rect">
             <a:avLst/>
@@ -5901,13 +6834,13 @@
       </p:pic>
       <p:pic>
         <p:nvPicPr>
-          <p:cNvPr id="18" name="Picture 17" descr="hist(cos(inclination))_dif_final2_p3.pdf"/>
+          <p:cNvPr id="84" name="Picture 83" descr="W(impact)_avgHistograms.pdf"/>
           <p:cNvPicPr>
-            <a:picLocks/>
+            <a:picLocks noChangeAspect="1"/>
           </p:cNvPicPr>
           <p:nvPr/>
         </p:nvPicPr>
-        <p:blipFill rotWithShape="1">
+        <p:blipFill>
           <a:blip r:embed="rId13">
             <a:extLst>
               <a:ext uri="{28A0092B-C50C-407E-A947-70E740481C1C}">
@@ -5915,80 +6848,14 @@
               </a:ext>
             </a:extLst>
           </a:blip>
-          <a:srcRect l="3455" r="7064"/>
-          <a:stretch/>
+          <a:stretch>
+            <a:fillRect/>
+          </a:stretch>
         </p:blipFill>
         <p:spPr>
           <a:xfrm>
-            <a:off x="1411128" y="34907482"/>
-            <a:ext cx="10656826" cy="2423160"/>
-          </a:xfrm>
-          <a:prstGeom prst="rect">
-            <a:avLst/>
-          </a:prstGeom>
-        </p:spPr>
-      </p:pic>
-      <p:cxnSp>
-        <p:nvCxnSpPr>
-          <p:cNvPr id="51" name="Straight Connector 50"/>
-          <p:cNvCxnSpPr/>
-          <p:nvPr/>
-        </p:nvCxnSpPr>
-        <p:spPr>
-          <a:xfrm flipV="1">
-            <a:off x="23099174" y="22455696"/>
-            <a:ext cx="5076905" cy="3573292"/>
-          </a:xfrm>
-          <a:prstGeom prst="line">
-            <a:avLst/>
-          </a:prstGeom>
-          <a:ln w="28575" cmpd="sng">
-            <a:solidFill>
-              <a:schemeClr val="tx1">
-                <a:alpha val="66000"/>
-              </a:schemeClr>
-            </a:solidFill>
-            <a:prstDash val="sysDash"/>
-          </a:ln>
-        </p:spPr>
-        <p:style>
-          <a:lnRef idx="1">
-            <a:schemeClr val="accent1"/>
-          </a:lnRef>
-          <a:fillRef idx="0">
-            <a:schemeClr val="accent1"/>
-          </a:fillRef>
-          <a:effectRef idx="0">
-            <a:schemeClr val="accent1"/>
-          </a:effectRef>
-          <a:fontRef idx="minor">
-            <a:schemeClr val="tx1"/>
-          </a:fontRef>
-        </p:style>
-      </p:cxnSp>
-      <p:pic>
-        <p:nvPicPr>
-          <p:cNvPr id="48" name="Picture 47" descr="W_vs_impact_final2.pdf"/>
-          <p:cNvPicPr>
-            <a:picLocks noChangeAspect="1"/>
-          </p:cNvPicPr>
-          <p:nvPr/>
-        </p:nvPicPr>
-        <p:blipFill rotWithShape="1">
-          <a:blip r:embed="rId14">
-            <a:extLst>
-              <a:ext uri="{28A0092B-C50C-407E-A947-70E740481C1C}">
-                <a14:useLocalDpi xmlns:a14="http://schemas.microsoft.com/office/drawing/2010/main" val="0"/>
-              </a:ext>
-            </a:extLst>
-          </a:blip>
-          <a:srcRect l="2712" t="7585" r="6966" b="1848"/>
-          <a:stretch/>
-        </p:blipFill>
-        <p:spPr>
-          <a:xfrm>
-            <a:off x="13350000" y="18706638"/>
-            <a:ext cx="4102641" cy="3085298"/>
+            <a:off x="13098338" y="18328161"/>
+            <a:ext cx="4537080" cy="3486750"/>
           </a:xfrm>
           <a:prstGeom prst="rect">
             <a:avLst/>
@@ -5997,27 +6864,28 @@
       </p:pic>
       <p:pic>
         <p:nvPicPr>
-          <p:cNvPr id="49" name="Picture 48" descr="W_vs_impact-diam_final2.pdf"/>
+          <p:cNvPr id="85" name="Picture 84" descr="W(fancy_inc)_percHistograms.pdf"/>
           <p:cNvPicPr>
             <a:picLocks noChangeAspect="1"/>
           </p:cNvPicPr>
           <p:nvPr/>
         </p:nvPicPr>
-        <p:blipFill rotWithShape="1">
-          <a:blip r:embed="rId15">
+        <p:blipFill>
+          <a:blip r:embed="rId14">
             <a:extLst>
               <a:ext uri="{28A0092B-C50C-407E-A947-70E740481C1C}">
                 <a14:useLocalDpi xmlns:a14="http://schemas.microsoft.com/office/drawing/2010/main" val="0"/>
               </a:ext>
             </a:extLst>
           </a:blip>
-          <a:srcRect l="3131" t="7122" r="8271" b="1919"/>
-          <a:stretch/>
+          <a:stretch>
+            <a:fillRect/>
+          </a:stretch>
         </p:blipFill>
         <p:spPr>
           <a:xfrm>
-            <a:off x="1411130" y="20337203"/>
-            <a:ext cx="9787725" cy="7536415"/>
+            <a:off x="17976715" y="18768372"/>
+            <a:ext cx="10509847" cy="8138600"/>
           </a:xfrm>
           <a:prstGeom prst="rect">
             <a:avLst/>
@@ -6026,561 +6894,34 @@
       </p:pic>
       <p:pic>
         <p:nvPicPr>
-          <p:cNvPr id="54" name="Picture 53" descr="hist(lyaW)_final2.pdf"/>
+          <p:cNvPr id="86" name="Picture 85" descr="hist(fancy_inclination)_red_blue_full_all.pdf"/>
           <p:cNvPicPr>
             <a:picLocks noChangeAspect="1"/>
           </p:cNvPicPr>
           <p:nvPr/>
         </p:nvPicPr>
-        <p:blipFill rotWithShape="1">
-          <a:blip r:embed="rId16">
+        <p:blipFill>
+          <a:blip r:embed="rId15">
             <a:extLst>
               <a:ext uri="{28A0092B-C50C-407E-A947-70E740481C1C}">
                 <a14:useLocalDpi xmlns:a14="http://schemas.microsoft.com/office/drawing/2010/main" val="0"/>
               </a:ext>
             </a:extLst>
           </a:blip>
-          <a:srcRect l="8032" t="9362" r="4385" b="5005"/>
-          <a:stretch/>
+          <a:stretch>
+            <a:fillRect/>
+          </a:stretch>
         </p:blipFill>
         <p:spPr>
           <a:xfrm>
-            <a:off x="11209877" y="20525123"/>
-            <a:ext cx="1601709" cy="7090048"/>
+            <a:off x="1211384" y="30036566"/>
+            <a:ext cx="11405104" cy="7228587"/>
           </a:xfrm>
           <a:prstGeom prst="rect">
             <a:avLst/>
           </a:prstGeom>
         </p:spPr>
       </p:pic>
-      <p:pic>
-        <p:nvPicPr>
-          <p:cNvPr id="57" name="Picture 56" descr="hist(Impact)_final.pdf"/>
-          <p:cNvPicPr>
-            <a:picLocks noChangeAspect="1"/>
-          </p:cNvPicPr>
-          <p:nvPr/>
-        </p:nvPicPr>
-        <p:blipFill rotWithShape="1">
-          <a:blip r:embed="rId17">
-            <a:extLst>
-              <a:ext uri="{28A0092B-C50C-407E-A947-70E740481C1C}">
-                <a14:useLocalDpi xmlns:a14="http://schemas.microsoft.com/office/drawing/2010/main" val="0"/>
-              </a:ext>
-            </a:extLst>
-          </a:blip>
-          <a:srcRect l="8029" t="6035" r="9257" b="6319"/>
-          <a:stretch/>
-        </p:blipFill>
-        <p:spPr>
-          <a:xfrm>
-            <a:off x="1972420" y="18748841"/>
-            <a:ext cx="9119575" cy="1602865"/>
-          </a:xfrm>
-          <a:prstGeom prst="rect">
-            <a:avLst/>
-          </a:prstGeom>
-        </p:spPr>
-      </p:pic>
-      <p:sp>
-        <p:nvSpPr>
-          <p:cNvPr id="62" name="TextBox 61"/>
-          <p:cNvSpPr txBox="1"/>
-          <p:nvPr/>
-        </p:nvSpPr>
-        <p:spPr>
-          <a:xfrm>
-            <a:off x="4787543" y="18796100"/>
-            <a:ext cx="3734487" cy="446276"/>
-          </a:xfrm>
-          <a:prstGeom prst="rect">
-            <a:avLst/>
-          </a:prstGeom>
-          <a:noFill/>
-        </p:spPr>
-        <p:txBody>
-          <a:bodyPr wrap="square" rtlCol="0">
-            <a:spAutoFit/>
-          </a:bodyPr>
-          <a:lstStyle/>
-          <a:p>
-            <a:r>
-              <a:rPr lang="en-US" sz="2300" dirty="0" smtClean="0"/>
-              <a:t>Impact parameter / Diameter</a:t>
-            </a:r>
-            <a:endParaRPr lang="en-US" sz="2300" dirty="0"/>
-          </a:p>
-        </p:txBody>
-      </p:sp>
-      <p:sp>
-        <p:nvSpPr>
-          <p:cNvPr id="67" name="TextBox 66"/>
-          <p:cNvSpPr txBox="1"/>
-          <p:nvPr/>
-        </p:nvSpPr>
-        <p:spPr>
-          <a:xfrm>
-            <a:off x="11425164" y="20562209"/>
-            <a:ext cx="1520773" cy="446276"/>
-          </a:xfrm>
-          <a:prstGeom prst="rect">
-            <a:avLst/>
-          </a:prstGeom>
-          <a:noFill/>
-        </p:spPr>
-        <p:txBody>
-          <a:bodyPr wrap="square" rtlCol="0">
-            <a:spAutoFit/>
-          </a:bodyPr>
-          <a:lstStyle/>
-          <a:p>
-            <a:r>
-              <a:rPr lang="en-US" sz="2300" dirty="0" smtClean="0"/>
-              <a:t>EW (</a:t>
-            </a:r>
-            <a:r>
-              <a:rPr lang="en-US" sz="2300" i="1" dirty="0" err="1" smtClean="0">
-                <a:solidFill>
-                  <a:srgbClr val="000000"/>
-                </a:solidFill>
-              </a:rPr>
-              <a:t>mÅ</a:t>
-            </a:r>
-            <a:r>
-              <a:rPr lang="en-US" sz="2300" i="1" dirty="0" smtClean="0">
-                <a:solidFill>
-                  <a:srgbClr val="000000"/>
-                </a:solidFill>
-              </a:rPr>
-              <a:t>)</a:t>
-            </a:r>
-            <a:endParaRPr lang="en-US" sz="2300" dirty="0"/>
-          </a:p>
-        </p:txBody>
-      </p:sp>
-      <p:sp>
-        <p:nvSpPr>
-          <p:cNvPr id="68" name="TextBox 67"/>
-          <p:cNvSpPr txBox="1"/>
-          <p:nvPr/>
-        </p:nvSpPr>
-        <p:spPr>
-          <a:xfrm>
-            <a:off x="1149430" y="37809490"/>
-            <a:ext cx="28115557" cy="677108"/>
-          </a:xfrm>
-          <a:prstGeom prst="rect">
-            <a:avLst/>
-          </a:prstGeom>
-          <a:noFill/>
-        </p:spPr>
-        <p:txBody>
-          <a:bodyPr wrap="square" rtlCol="0">
-            <a:spAutoFit/>
-          </a:bodyPr>
-          <a:lstStyle/>
-          <a:p>
-            <a:r>
-              <a:rPr lang="en-US" sz="1300" dirty="0" smtClean="0">
-                <a:solidFill>
-                  <a:srgbClr val="FFFFFF"/>
-                </a:solidFill>
-              </a:rPr>
-              <a:t>Acknowledgements:  </a:t>
-            </a:r>
-            <a:r>
-              <a:rPr lang="en-US" sz="1300" dirty="0">
-                <a:solidFill>
-                  <a:srgbClr val="FFFFFF"/>
-                </a:solidFill>
-              </a:rPr>
-              <a:t>This research has made use of the NASA/IPAC Extragalactic Database (NED) which is operated by the Jet Propulsion Laboratory, California Institute of Technology, under contract with the National Aeronautics and Space Administration</a:t>
-            </a:r>
-            <a:r>
-              <a:rPr lang="en-US" sz="1300" dirty="0" smtClean="0">
-                <a:solidFill>
-                  <a:srgbClr val="FFFFFF"/>
-                </a:solidFill>
-              </a:rPr>
-              <a:t>.</a:t>
-            </a:r>
-          </a:p>
-          <a:p>
-            <a:r>
-              <a:rPr lang="en-US" sz="1300" dirty="0" smtClean="0">
-                <a:solidFill>
-                  <a:srgbClr val="FFFFFF"/>
-                </a:solidFill>
-              </a:rPr>
-              <a:t>References: </a:t>
-            </a:r>
-            <a:r>
-              <a:rPr lang="tr-TR" sz="1300" dirty="0" err="1" smtClean="0">
-                <a:solidFill>
-                  <a:srgbClr val="FFFFFF"/>
-                </a:solidFill>
-              </a:rPr>
-              <a:t>Danforth</a:t>
-            </a:r>
-            <a:r>
-              <a:rPr lang="tr-TR" sz="1300" dirty="0" smtClean="0">
-                <a:solidFill>
-                  <a:srgbClr val="FFFFFF"/>
-                </a:solidFill>
-              </a:rPr>
-              <a:t> et al. 2014, </a:t>
-            </a:r>
-            <a:r>
-              <a:rPr lang="en-US" sz="1300" dirty="0" smtClean="0">
-                <a:solidFill>
-                  <a:srgbClr val="FFFFFF"/>
-                </a:solidFill>
-              </a:rPr>
-              <a:t>arXiv1402.2655D; </a:t>
-            </a:r>
-            <a:r>
-              <a:rPr lang="pl-PL" sz="1300" dirty="0">
-                <a:solidFill>
-                  <a:srgbClr val="FFFFFF"/>
-                </a:solidFill>
-              </a:rPr>
-              <a:t>Kacprzak, G.G., et al. 2012, </a:t>
-            </a:r>
-            <a:r>
-              <a:rPr lang="pl-PL" sz="1300" dirty="0" err="1">
-                <a:solidFill>
-                  <a:srgbClr val="FFFFFF"/>
-                </a:solidFill>
-              </a:rPr>
-              <a:t>ApJL</a:t>
-            </a:r>
-            <a:r>
-              <a:rPr lang="pl-PL" sz="1300" dirty="0">
-                <a:solidFill>
-                  <a:srgbClr val="FFFFFF"/>
-                </a:solidFill>
-              </a:rPr>
-              <a:t>, 760, </a:t>
-            </a:r>
-            <a:r>
-              <a:rPr lang="pl-PL" sz="1300" dirty="0" smtClean="0">
-                <a:solidFill>
-                  <a:srgbClr val="FFFFFF"/>
-                </a:solidFill>
-              </a:rPr>
-              <a:t>L7; </a:t>
-            </a:r>
-            <a:r>
-              <a:rPr lang="da-DK" sz="1300" dirty="0" err="1" smtClean="0">
-                <a:solidFill>
-                  <a:srgbClr val="FFFFFF"/>
-                </a:solidFill>
-              </a:rPr>
-              <a:t>McLin</a:t>
-            </a:r>
-            <a:r>
-              <a:rPr lang="da-DK" sz="1300" dirty="0">
-                <a:solidFill>
-                  <a:srgbClr val="FFFFFF"/>
-                </a:solidFill>
-              </a:rPr>
-              <a:t>, K.  et al. 2002, </a:t>
-            </a:r>
-            <a:r>
-              <a:rPr lang="da-DK" sz="1300" dirty="0" err="1">
-                <a:solidFill>
-                  <a:srgbClr val="FFFFFF"/>
-                </a:solidFill>
-              </a:rPr>
-              <a:t>ApJL</a:t>
-            </a:r>
-            <a:r>
-              <a:rPr lang="da-DK" sz="1300" dirty="0">
-                <a:solidFill>
-                  <a:srgbClr val="FFFFFF"/>
-                </a:solidFill>
-              </a:rPr>
-              <a:t>, 574, </a:t>
-            </a:r>
-            <a:r>
-              <a:rPr lang="da-DK" sz="1300" dirty="0" smtClean="0">
-                <a:solidFill>
-                  <a:srgbClr val="FFFFFF"/>
-                </a:solidFill>
-              </a:rPr>
-              <a:t>L115; </a:t>
-            </a:r>
-            <a:r>
-              <a:rPr lang="nb-NO" sz="1300" dirty="0" err="1">
-                <a:solidFill>
-                  <a:srgbClr val="FFFFFF"/>
-                </a:solidFill>
-              </a:rPr>
-              <a:t>Oppenheimer</a:t>
-            </a:r>
-            <a:r>
-              <a:rPr lang="nb-NO" sz="1300" dirty="0">
-                <a:solidFill>
-                  <a:srgbClr val="FFFFFF"/>
-                </a:solidFill>
-              </a:rPr>
-              <a:t>, B.D. et al. 2012, MNRAS, 420, </a:t>
-            </a:r>
-            <a:r>
-              <a:rPr lang="nb-NO" sz="1300" dirty="0" smtClean="0">
-                <a:solidFill>
-                  <a:srgbClr val="FFFFFF"/>
-                </a:solidFill>
-              </a:rPr>
-              <a:t>829</a:t>
-            </a:r>
-            <a:r>
-              <a:rPr lang="da-DK" sz="1300" dirty="0" smtClean="0">
-                <a:solidFill>
-                  <a:srgbClr val="FFFFFF"/>
-                </a:solidFill>
-              </a:rPr>
-              <a:t>; </a:t>
-            </a:r>
-            <a:r>
-              <a:rPr lang="pl-PL" sz="1300" dirty="0">
-                <a:solidFill>
-                  <a:srgbClr val="FFFFFF"/>
-                </a:solidFill>
-              </a:rPr>
-              <a:t>; </a:t>
-            </a:r>
-            <a:r>
-              <a:rPr lang="sv-SE" sz="1300" dirty="0" err="1">
-                <a:solidFill>
-                  <a:srgbClr val="FFFFFF"/>
-                </a:solidFill>
-              </a:rPr>
-              <a:t>Prochaska</a:t>
-            </a:r>
-            <a:r>
-              <a:rPr lang="sv-SE" sz="1300" dirty="0">
-                <a:solidFill>
-                  <a:srgbClr val="FFFFFF"/>
-                </a:solidFill>
-              </a:rPr>
-              <a:t>, J.X. 2011, </a:t>
-            </a:r>
-            <a:r>
-              <a:rPr lang="sv-SE" sz="1300" dirty="0" err="1">
-                <a:solidFill>
-                  <a:srgbClr val="FFFFFF"/>
-                </a:solidFill>
-              </a:rPr>
-              <a:t>ApJ</a:t>
-            </a:r>
-            <a:r>
-              <a:rPr lang="sv-SE" sz="1300" dirty="0">
-                <a:solidFill>
-                  <a:srgbClr val="FFFFFF"/>
-                </a:solidFill>
-              </a:rPr>
-              <a:t>, 740, p.91; </a:t>
-            </a:r>
-            <a:r>
-              <a:rPr lang="da-DK" sz="1300" dirty="0" err="1">
-                <a:solidFill>
-                  <a:srgbClr val="FFFFFF"/>
-                </a:solidFill>
-              </a:rPr>
-              <a:t>Rudie</a:t>
-            </a:r>
-            <a:r>
-              <a:rPr lang="da-DK" sz="1300" dirty="0">
-                <a:solidFill>
-                  <a:srgbClr val="FFFFFF"/>
-                </a:solidFill>
-              </a:rPr>
-              <a:t>, G.C., et al. 2012, </a:t>
-            </a:r>
-            <a:r>
-              <a:rPr lang="da-DK" sz="1300" dirty="0" err="1">
-                <a:solidFill>
-                  <a:srgbClr val="FFFFFF"/>
-                </a:solidFill>
-              </a:rPr>
-              <a:t>ApJ</a:t>
-            </a:r>
-            <a:r>
-              <a:rPr lang="da-DK" sz="1300" dirty="0">
-                <a:solidFill>
-                  <a:srgbClr val="FFFFFF"/>
-                </a:solidFill>
-              </a:rPr>
-              <a:t>, 750, p.67; </a:t>
-            </a:r>
-            <a:r>
-              <a:rPr lang="en-US" sz="1300" dirty="0" smtClean="0">
-                <a:solidFill>
-                  <a:srgbClr val="FFFFFF"/>
-                </a:solidFill>
-              </a:rPr>
-              <a:t>Shull</a:t>
-            </a:r>
-            <a:r>
-              <a:rPr lang="en-US" sz="1300" dirty="0">
-                <a:solidFill>
-                  <a:srgbClr val="FFFFFF"/>
-                </a:solidFill>
-              </a:rPr>
-              <a:t>, J.M., Smith, </a:t>
-            </a:r>
-            <a:r>
-              <a:rPr lang="en-US" sz="1300" dirty="0" smtClean="0">
-                <a:solidFill>
-                  <a:srgbClr val="FFFFFF"/>
-                </a:solidFill>
-              </a:rPr>
-              <a:t>B.D</a:t>
-            </a:r>
-            <a:r>
-              <a:rPr lang="en-US" sz="1300" dirty="0">
-                <a:solidFill>
-                  <a:srgbClr val="FFFFFF"/>
-                </a:solidFill>
-              </a:rPr>
-              <a:t>., </a:t>
-            </a:r>
-            <a:r>
-              <a:rPr lang="en-US" sz="1300" dirty="0" smtClean="0">
-                <a:solidFill>
-                  <a:srgbClr val="FFFFFF"/>
-                </a:solidFill>
-              </a:rPr>
-              <a:t>&amp; </a:t>
-            </a:r>
-            <a:r>
-              <a:rPr lang="en-US" sz="1300" dirty="0">
-                <a:solidFill>
-                  <a:srgbClr val="FFFFFF"/>
-                </a:solidFill>
-              </a:rPr>
-              <a:t>Danforth, C.W. 2012, </a:t>
-            </a:r>
-            <a:r>
-              <a:rPr lang="en-US" sz="1300" dirty="0" err="1">
-                <a:solidFill>
-                  <a:srgbClr val="FFFFFF"/>
-                </a:solidFill>
-              </a:rPr>
-              <a:t>ApJ</a:t>
-            </a:r>
-            <a:r>
-              <a:rPr lang="en-US" sz="1300" dirty="0">
-                <a:solidFill>
-                  <a:srgbClr val="FFFFFF"/>
-                </a:solidFill>
-              </a:rPr>
-              <a:t> 759, </a:t>
-            </a:r>
-            <a:r>
-              <a:rPr lang="en-US" sz="1300" dirty="0" smtClean="0">
-                <a:solidFill>
-                  <a:srgbClr val="FFFFFF"/>
-                </a:solidFill>
-              </a:rPr>
-              <a:t>23; </a:t>
-            </a:r>
-            <a:r>
-              <a:rPr lang="da-DK" sz="1300" dirty="0" err="1">
-                <a:solidFill>
-                  <a:srgbClr val="FFFFFF"/>
-                </a:solidFill>
-              </a:rPr>
-              <a:t>Tully</a:t>
-            </a:r>
-            <a:r>
-              <a:rPr lang="da-DK" sz="1300" dirty="0">
-                <a:solidFill>
-                  <a:srgbClr val="FFFFFF"/>
-                </a:solidFill>
-              </a:rPr>
-              <a:t>, R.B. et al. 2013, AJ, 146, 86; </a:t>
-            </a:r>
-            <a:r>
-              <a:rPr lang="tr-TR" sz="1300" dirty="0" err="1" smtClean="0">
-                <a:solidFill>
-                  <a:srgbClr val="FFFFFF"/>
-                </a:solidFill>
-              </a:rPr>
-              <a:t>Wakker</a:t>
-            </a:r>
-            <a:r>
-              <a:rPr lang="tr-TR" sz="1300" dirty="0" smtClean="0">
-                <a:solidFill>
-                  <a:srgbClr val="FFFFFF"/>
-                </a:solidFill>
-              </a:rPr>
-              <a:t> </a:t>
-            </a:r>
-            <a:r>
-              <a:rPr lang="tr-TR" sz="1300" dirty="0">
-                <a:solidFill>
-                  <a:srgbClr val="FFFFFF"/>
-                </a:solidFill>
-              </a:rPr>
-              <a:t>B.P. &amp; </a:t>
-            </a:r>
-            <a:r>
-              <a:rPr lang="tr-TR" sz="1300" dirty="0" err="1">
-                <a:solidFill>
-                  <a:srgbClr val="FFFFFF"/>
-                </a:solidFill>
-              </a:rPr>
-              <a:t>Savage</a:t>
-            </a:r>
-            <a:r>
-              <a:rPr lang="tr-TR" sz="1300" dirty="0">
-                <a:solidFill>
-                  <a:srgbClr val="FFFFFF"/>
-                </a:solidFill>
-              </a:rPr>
-              <a:t> B.D. 2009, </a:t>
-            </a:r>
-            <a:r>
-              <a:rPr lang="tr-TR" sz="1300" dirty="0" err="1">
-                <a:solidFill>
-                  <a:srgbClr val="FFFFFF"/>
-                </a:solidFill>
-              </a:rPr>
-              <a:t>ApJs</a:t>
-            </a:r>
-            <a:r>
-              <a:rPr lang="tr-TR" sz="1300" dirty="0">
-                <a:solidFill>
-                  <a:srgbClr val="FFFFFF"/>
-                </a:solidFill>
-              </a:rPr>
-              <a:t>, 182, p.</a:t>
-            </a:r>
-            <a:r>
-              <a:rPr lang="tr-TR" sz="1300" dirty="0" smtClean="0">
-                <a:solidFill>
-                  <a:srgbClr val="FFFFFF"/>
-                </a:solidFill>
-              </a:rPr>
-              <a:t>378</a:t>
-            </a:r>
-            <a:endParaRPr lang="en-US" sz="1300" dirty="0">
-              <a:solidFill>
-                <a:srgbClr val="FFFFFF"/>
-              </a:solidFill>
-            </a:endParaRPr>
-          </a:p>
-          <a:p>
-            <a:endParaRPr lang="en-US" sz="1200" dirty="0">
-              <a:solidFill>
-                <a:srgbClr val="FFFFFF"/>
-              </a:solidFill>
-            </a:endParaRPr>
-          </a:p>
-        </p:txBody>
-      </p:sp>
     </p:spTree>
     <p:extLst>
       <p:ext uri="{BB962C8B-B14F-4D97-AF65-F5344CB8AC3E}">

</xml_diff>